<commit_message>
slides: echo added to terminal commands
</commit_message>
<xml_diff>
--- a/slides/terminal.pptx
+++ b/slides/terminal.pptx
@@ -5,27 +5,28 @@
     <p:sldMasterId id="2147484294" r:id="rId1"/>
   </p:sldMasterIdLst>
   <p:notesMasterIdLst>
-    <p:notesMasterId r:id="rId20"/>
+    <p:notesMasterId r:id="rId21"/>
   </p:notesMasterIdLst>
   <p:sldIdLst>
     <p:sldId id="256" r:id="rId2"/>
     <p:sldId id="257" r:id="rId3"/>
     <p:sldId id="258" r:id="rId4"/>
     <p:sldId id="271" r:id="rId5"/>
-    <p:sldId id="259" r:id="rId6"/>
-    <p:sldId id="260" r:id="rId7"/>
-    <p:sldId id="261" r:id="rId8"/>
-    <p:sldId id="262" r:id="rId9"/>
-    <p:sldId id="270" r:id="rId10"/>
-    <p:sldId id="263" r:id="rId11"/>
-    <p:sldId id="265" r:id="rId12"/>
-    <p:sldId id="264" r:id="rId13"/>
-    <p:sldId id="273" r:id="rId14"/>
-    <p:sldId id="266" r:id="rId15"/>
-    <p:sldId id="272" r:id="rId16"/>
-    <p:sldId id="267" r:id="rId17"/>
-    <p:sldId id="268" r:id="rId18"/>
-    <p:sldId id="269" r:id="rId19"/>
+    <p:sldId id="274" r:id="rId6"/>
+    <p:sldId id="259" r:id="rId7"/>
+    <p:sldId id="260" r:id="rId8"/>
+    <p:sldId id="261" r:id="rId9"/>
+    <p:sldId id="262" r:id="rId10"/>
+    <p:sldId id="270" r:id="rId11"/>
+    <p:sldId id="263" r:id="rId12"/>
+    <p:sldId id="265" r:id="rId13"/>
+    <p:sldId id="264" r:id="rId14"/>
+    <p:sldId id="273" r:id="rId15"/>
+    <p:sldId id="266" r:id="rId16"/>
+    <p:sldId id="272" r:id="rId17"/>
+    <p:sldId id="267" r:id="rId18"/>
+    <p:sldId id="268" r:id="rId19"/>
+    <p:sldId id="269" r:id="rId20"/>
   </p:sldIdLst>
   <p:sldSz cx="12192000" cy="6858000"/>
   <p:notesSz cx="6858000" cy="9144000"/>
@@ -214,7 +215,7 @@
           <a:p>
             <a:fld id="{6C47881A-27B6-E34F-9EF6-BF109EBF38B9}" type="datetimeFigureOut">
               <a:rPr lang="en-US" smtClean="0"/>
-              <a:t>5/7/21</a:t>
+              <a:t>5/10/21</a:t>
             </a:fld>
             <a:endParaRPr lang="en-US"/>
           </a:p>
@@ -619,6 +620,93 @@
           <a:p>
             <a:r>
               <a:rPr lang="en-US" dirty="0"/>
+              <a:t>No spaces in the item assignment for x! </a:t>
+            </a:r>
+          </a:p>
+        </p:txBody>
+      </p:sp>
+      <p:sp>
+        <p:nvSpPr>
+          <p:cNvPr id="4" name="Slide Number Placeholder 3"/>
+          <p:cNvSpPr>
+            <a:spLocks noGrp="1"/>
+          </p:cNvSpPr>
+          <p:nvPr>
+            <p:ph type="sldNum" sz="quarter" idx="5"/>
+          </p:nvPr>
+        </p:nvSpPr>
+        <p:spPr/>
+        <p:txBody>
+          <a:bodyPr/>
+          <a:lstStyle/>
+          <a:p>
+            <a:fld id="{76A41E2A-9760-1B43-867A-973D47E0F35B}" type="slidenum">
+              <a:rPr lang="en-US" smtClean="0"/>
+              <a:t>5</a:t>
+            </a:fld>
+            <a:endParaRPr lang="en-US"/>
+          </a:p>
+        </p:txBody>
+      </p:sp>
+    </p:spTree>
+    <p:extLst>
+      <p:ext uri="{BB962C8B-B14F-4D97-AF65-F5344CB8AC3E}">
+        <p14:creationId xmlns:p14="http://schemas.microsoft.com/office/powerpoint/2010/main" val="2416133423"/>
+      </p:ext>
+    </p:extLst>
+  </p:cSld>
+  <p:clrMapOvr>
+    <a:masterClrMapping/>
+  </p:clrMapOvr>
+</p:notes>
+</file>
+
+<file path=ppt/notesSlides/notesSlide3.xml><?xml version="1.0" encoding="utf-8"?>
+<p:notes xmlns:a="http://schemas.openxmlformats.org/drawingml/2006/main" xmlns:r="http://schemas.openxmlformats.org/officeDocument/2006/relationships" xmlns:p="http://schemas.openxmlformats.org/presentationml/2006/main">
+  <p:cSld>
+    <p:spTree>
+      <p:nvGrpSpPr>
+        <p:cNvPr id="1" name=""/>
+        <p:cNvGrpSpPr/>
+        <p:nvPr/>
+      </p:nvGrpSpPr>
+      <p:grpSpPr>
+        <a:xfrm>
+          <a:off x="0" y="0"/>
+          <a:ext cx="0" cy="0"/>
+          <a:chOff x="0" y="0"/>
+          <a:chExt cx="0" cy="0"/>
+        </a:xfrm>
+      </p:grpSpPr>
+      <p:sp>
+        <p:nvSpPr>
+          <p:cNvPr id="2" name="Slide Image Placeholder 1"/>
+          <p:cNvSpPr>
+            <a:spLocks noGrp="1" noRot="1" noChangeAspect="1"/>
+          </p:cNvSpPr>
+          <p:nvPr>
+            <p:ph type="sldImg"/>
+          </p:nvPr>
+        </p:nvSpPr>
+        <p:spPr/>
+      </p:sp>
+      <p:sp>
+        <p:nvSpPr>
+          <p:cNvPr id="3" name="Notes Placeholder 2"/>
+          <p:cNvSpPr>
+            <a:spLocks noGrp="1"/>
+          </p:cNvSpPr>
+          <p:nvPr>
+            <p:ph type="body" idx="1"/>
+          </p:nvPr>
+        </p:nvSpPr>
+        <p:spPr/>
+        <p:txBody>
+          <a:bodyPr/>
+          <a:lstStyle/>
+          <a:p>
+            <a:r>
+              <a:rPr lang="en-US" dirty="0"/>
               <a:t>For those who may not have seen it before, “python </a:t>
             </a:r>
             <a:r>
@@ -649,7 +737,7 @@
           <a:p>
             <a:fld id="{76A41E2A-9760-1B43-867A-973D47E0F35B}" type="slidenum">
               <a:rPr lang="en-US" smtClean="0"/>
-              <a:t>16</a:t>
+              <a:t>17</a:t>
             </a:fld>
             <a:endParaRPr lang="en-US"/>
           </a:p>
@@ -944,7 +1032,7 @@
           <a:p>
             <a:fld id="{51673806-0BCD-1F42-BAA8-2011034B3C6A}" type="datetimeFigureOut">
               <a:rPr lang="en-US" smtClean="0"/>
-              <a:t>5/7/21</a:t>
+              <a:t>5/10/21</a:t>
             </a:fld>
             <a:endParaRPr lang="en-US"/>
           </a:p>
@@ -1358,7 +1446,7 @@
           <a:p>
             <a:fld id="{51673806-0BCD-1F42-BAA8-2011034B3C6A}" type="datetimeFigureOut">
               <a:rPr lang="en-US" smtClean="0"/>
-              <a:t>5/7/21</a:t>
+              <a:t>5/10/21</a:t>
             </a:fld>
             <a:endParaRPr lang="en-US"/>
           </a:p>
@@ -1689,7 +1777,7 @@
           <a:p>
             <a:fld id="{51673806-0BCD-1F42-BAA8-2011034B3C6A}" type="datetimeFigureOut">
               <a:rPr lang="en-US" smtClean="0"/>
-              <a:t>5/7/21</a:t>
+              <a:t>5/10/21</a:t>
             </a:fld>
             <a:endParaRPr lang="en-US"/>
           </a:p>
@@ -2089,7 +2177,7 @@
           <a:p>
             <a:fld id="{51673806-0BCD-1F42-BAA8-2011034B3C6A}" type="datetimeFigureOut">
               <a:rPr lang="en-US" smtClean="0"/>
-              <a:t>5/7/21</a:t>
+              <a:t>5/10/21</a:t>
             </a:fld>
             <a:endParaRPr lang="en-US"/>
           </a:p>
@@ -2652,7 +2740,7 @@
           <a:p>
             <a:fld id="{51673806-0BCD-1F42-BAA8-2011034B3C6A}" type="datetimeFigureOut">
               <a:rPr lang="en-US" smtClean="0"/>
-              <a:t>5/7/21</a:t>
+              <a:t>5/10/21</a:t>
             </a:fld>
             <a:endParaRPr lang="en-US"/>
           </a:p>
@@ -3328,7 +3416,7 @@
           <a:p>
             <a:fld id="{51673806-0BCD-1F42-BAA8-2011034B3C6A}" type="datetimeFigureOut">
               <a:rPr lang="en-US" smtClean="0"/>
-              <a:t>5/7/21</a:t>
+              <a:t>5/10/21</a:t>
             </a:fld>
             <a:endParaRPr lang="en-US"/>
           </a:p>
@@ -4236,7 +4324,7 @@
           <a:p>
             <a:fld id="{51673806-0BCD-1F42-BAA8-2011034B3C6A}" type="datetimeFigureOut">
               <a:rPr lang="en-US" smtClean="0"/>
-              <a:t>5/7/21</a:t>
+              <a:t>5/10/21</a:t>
             </a:fld>
             <a:endParaRPr lang="en-US"/>
           </a:p>
@@ -4544,7 +4632,7 @@
           <a:p>
             <a:fld id="{51673806-0BCD-1F42-BAA8-2011034B3C6A}" type="datetimeFigureOut">
               <a:rPr lang="en-US" smtClean="0"/>
-              <a:t>5/7/21</a:t>
+              <a:t>5/10/21</a:t>
             </a:fld>
             <a:endParaRPr lang="en-US"/>
           </a:p>
@@ -4803,7 +4891,7 @@
           <a:p>
             <a:fld id="{51673806-0BCD-1F42-BAA8-2011034B3C6A}" type="datetimeFigureOut">
               <a:rPr lang="en-US" smtClean="0"/>
-              <a:t>5/7/21</a:t>
+              <a:t>5/10/21</a:t>
             </a:fld>
             <a:endParaRPr lang="en-US"/>
           </a:p>
@@ -5126,7 +5214,7 @@
           <a:p>
             <a:fld id="{51673806-0BCD-1F42-BAA8-2011034B3C6A}" type="datetimeFigureOut">
               <a:rPr lang="en-US" smtClean="0"/>
-              <a:t>5/7/21</a:t>
+              <a:t>5/10/21</a:t>
             </a:fld>
             <a:endParaRPr lang="en-US"/>
           </a:p>
@@ -5510,7 +5598,7 @@
           <a:p>
             <a:fld id="{51673806-0BCD-1F42-BAA8-2011034B3C6A}" type="datetimeFigureOut">
               <a:rPr lang="en-US" smtClean="0"/>
-              <a:t>5/7/21</a:t>
+              <a:t>5/10/21</a:t>
             </a:fld>
             <a:endParaRPr lang="en-US"/>
           </a:p>
@@ -5886,7 +5974,7 @@
           <a:p>
             <a:fld id="{51673806-0BCD-1F42-BAA8-2011034B3C6A}" type="datetimeFigureOut">
               <a:rPr lang="en-US" smtClean="0"/>
-              <a:t>5/7/21</a:t>
+              <a:t>5/10/21</a:t>
             </a:fld>
             <a:endParaRPr lang="en-US"/>
           </a:p>
@@ -6392,7 +6480,7 @@
           <a:p>
             <a:fld id="{51673806-0BCD-1F42-BAA8-2011034B3C6A}" type="datetimeFigureOut">
               <a:rPr lang="en-US" smtClean="0"/>
-              <a:t>5/7/21</a:t>
+              <a:t>5/10/21</a:t>
             </a:fld>
             <a:endParaRPr lang="en-US"/>
           </a:p>
@@ -6649,7 +6737,7 @@
           <a:p>
             <a:fld id="{51673806-0BCD-1F42-BAA8-2011034B3C6A}" type="datetimeFigureOut">
               <a:rPr lang="en-US" smtClean="0"/>
-              <a:t>5/7/21</a:t>
+              <a:t>5/10/21</a:t>
             </a:fld>
             <a:endParaRPr lang="en-US"/>
           </a:p>
@@ -6807,7 +6895,7 @@
           <a:p>
             <a:fld id="{51673806-0BCD-1F42-BAA8-2011034B3C6A}" type="datetimeFigureOut">
               <a:rPr lang="en-US" smtClean="0"/>
-              <a:t>5/7/21</a:t>
+              <a:t>5/10/21</a:t>
             </a:fld>
             <a:endParaRPr lang="en-US"/>
           </a:p>
@@ -7197,7 +7285,7 @@
           <a:p>
             <a:fld id="{51673806-0BCD-1F42-BAA8-2011034B3C6A}" type="datetimeFigureOut">
               <a:rPr lang="en-US" smtClean="0"/>
-              <a:t>5/7/21</a:t>
+              <a:t>5/10/21</a:t>
             </a:fld>
             <a:endParaRPr lang="en-US"/>
           </a:p>
@@ -7606,7 +7694,7 @@
           <a:p>
             <a:fld id="{51673806-0BCD-1F42-BAA8-2011034B3C6A}" type="datetimeFigureOut">
               <a:rPr lang="en-US" smtClean="0"/>
-              <a:t>5/7/21</a:t>
+              <a:t>5/10/21</a:t>
             </a:fld>
             <a:endParaRPr lang="en-US"/>
           </a:p>
@@ -7852,7 +7940,7 @@
             <a:fld id="{51673806-0BCD-1F42-BAA8-2011034B3C6A}" type="datetimeFigureOut">
               <a:rPr lang="en-US" smtClean="0"/>
               <a:pPr/>
-              <a:t>5/7/21</a:t>
+              <a:t>5/10/21</a:t>
             </a:fld>
             <a:endParaRPr lang="en-US" dirty="0"/>
           </a:p>
@@ -8384,11 +8472,19 @@
           <a:p>
             <a:r>
               <a:rPr lang="en-US" i="1" dirty="0" err="1"/>
-              <a:t>mkdir</a:t>
-            </a:r>
-            <a:r>
-              <a:rPr lang="en-US" dirty="0"/>
-              <a:t>: Make Directory </a:t>
+              <a:t>cp</a:t>
+            </a:r>
+            <a:r>
+              <a:rPr lang="en-US" dirty="0"/>
+              <a:t>: Copy [</a:t>
+            </a:r>
+            <a:r>
+              <a:rPr lang="en-US" i="1" dirty="0"/>
+              <a:t>copy</a:t>
+            </a:r>
+            <a:r>
+              <a:rPr lang="en-US" dirty="0"/>
+              <a:t>] </a:t>
             </a:r>
             <a:endParaRPr lang="en-US" i="1" dirty="0"/>
           </a:p>
@@ -8404,50 +8500,29 @@
             <p:ph idx="1"/>
           </p:nvPr>
         </p:nvSpPr>
-        <p:spPr/>
-        <p:txBody>
-          <a:bodyPr/>
+        <p:spPr>
+          <a:xfrm>
+            <a:off x="680321" y="2336872"/>
+            <a:ext cx="9613861" cy="4405121"/>
+          </a:xfrm>
+        </p:spPr>
+        <p:txBody>
+          <a:bodyPr>
+            <a:normAutofit/>
+          </a:bodyPr>
           <a:lstStyle/>
           <a:p>
-            <a:pPr marL="0" marR="0" lvl="0" indent="0" defTabSz="914400" eaLnBrk="1" fontAlgn="auto" latinLnBrk="0" hangingPunct="1">
-              <a:lnSpc>
-                <a:spcPct val="100000"/>
-              </a:lnSpc>
-              <a:spcBef>
-                <a:spcPts val="0"/>
-              </a:spcBef>
-              <a:spcAft>
-                <a:spcPts val="0"/>
-              </a:spcAft>
-              <a:buClrTx/>
-              <a:buSzTx/>
-              <a:buFontTx/>
-              <a:buNone/>
-              <a:tabLst/>
-              <a:defRPr/>
-            </a:pPr>
-            <a:r>
-              <a:rPr lang="en-US" dirty="0"/>
-              <a:t>Create a new directory (same as clicking “New Folder” in a Finder window) </a:t>
-            </a:r>
-          </a:p>
-          <a:p>
-            <a:pPr marL="0" marR="0" lvl="0" indent="0" defTabSz="914400" eaLnBrk="1" fontAlgn="auto" latinLnBrk="0" hangingPunct="1">
-              <a:lnSpc>
-                <a:spcPct val="100000"/>
-              </a:lnSpc>
-              <a:spcBef>
-                <a:spcPts val="0"/>
-              </a:spcBef>
-              <a:spcAft>
-                <a:spcPts val="0"/>
-              </a:spcAft>
-              <a:buClrTx/>
-              <a:buSzTx/>
-              <a:buFontTx/>
-              <a:buNone/>
-              <a:tabLst/>
-              <a:defRPr/>
+            <a:pPr marL="0" indent="0">
+              <a:buNone/>
+            </a:pPr>
+            <a:r>
+              <a:rPr lang="en-US" dirty="0"/>
+              <a:t>Copy a file to a new name/location </a:t>
+            </a:r>
+          </a:p>
+          <a:p>
+            <a:pPr marL="0" indent="0">
+              <a:buNone/>
             </a:pPr>
             <a:r>
               <a:rPr lang="en-US" dirty="0"/>
@@ -8455,51 +8530,23 @@
             </a:r>
             <a:r>
               <a:rPr lang="en-US" i="1" dirty="0" err="1"/>
-              <a:t>mkdir</a:t>
+              <a:t>cp</a:t>
             </a:r>
             <a:r>
               <a:rPr lang="en-US" i="1" dirty="0"/>
-              <a:t> [directory name] </a:t>
+              <a:t> [existing file name] [new file name] </a:t>
             </a:r>
             <a:endParaRPr lang="en-US" dirty="0"/>
           </a:p>
           <a:p>
-            <a:pPr marL="0" marR="0" lvl="0" indent="0" defTabSz="914400" eaLnBrk="1" fontAlgn="auto" latinLnBrk="0" hangingPunct="1">
-              <a:lnSpc>
-                <a:spcPct val="100000"/>
-              </a:lnSpc>
-              <a:spcBef>
-                <a:spcPts val="0"/>
-              </a:spcBef>
-              <a:spcAft>
-                <a:spcPts val="0"/>
-              </a:spcAft>
-              <a:buClrTx/>
-              <a:buSzTx/>
-              <a:buFontTx/>
-              <a:buNone/>
-              <a:tabLst/>
-              <a:defRPr/>
+            <a:pPr marL="0" indent="0">
+              <a:buNone/>
             </a:pPr>
             <a:endParaRPr lang="en-US" dirty="0"/>
           </a:p>
           <a:p>
-            <a:pPr marL="0" marR="0" lvl="0" indent="0" defTabSz="914400" eaLnBrk="1" fontAlgn="auto" latinLnBrk="0" hangingPunct="1">
-              <a:lnSpc>
-                <a:spcPct val="100000"/>
-              </a:lnSpc>
-              <a:spcBef>
-                <a:spcPts val="0"/>
-              </a:spcBef>
-              <a:spcAft>
-                <a:spcPts val="0"/>
-              </a:spcAft>
-              <a:buClrTx/>
-              <a:buSzTx/>
-              <a:buFontTx/>
-              <a:buNone/>
-              <a:tabLst/>
-              <a:defRPr/>
+            <a:pPr marL="0" indent="0">
+              <a:buNone/>
             </a:pPr>
             <a:r>
               <a:rPr lang="en-US" dirty="0"/>
@@ -8507,22 +8554,42 @@
             </a:r>
           </a:p>
           <a:p>
-            <a:pPr marL="0" marR="0" lvl="0" indent="0" defTabSz="914400" eaLnBrk="1" fontAlgn="auto" latinLnBrk="0" hangingPunct="1">
-              <a:lnSpc>
-                <a:spcPct val="100000"/>
-              </a:lnSpc>
-              <a:spcBef>
-                <a:spcPts val="0"/>
-              </a:spcBef>
-              <a:spcAft>
-                <a:spcPts val="0"/>
-              </a:spcAft>
-              <a:buClrTx/>
-              <a:buSzTx/>
-              <a:buFontTx/>
-              <a:buNone/>
-              <a:tabLst/>
-              <a:defRPr/>
+            <a:pPr marL="0" indent="0">
+              <a:buNone/>
+            </a:pPr>
+            <a:r>
+              <a:rPr lang="en-US" dirty="0"/>
+              <a:t>	$ ls </a:t>
+            </a:r>
+          </a:p>
+          <a:p>
+            <a:pPr marL="0" indent="0">
+              <a:buNone/>
+            </a:pPr>
+            <a:r>
+              <a:rPr lang="en-US" dirty="0"/>
+              <a:t>	</a:t>
+            </a:r>
+            <a:r>
+              <a:rPr lang="en-US" dirty="0" err="1"/>
+              <a:t>data.dat</a:t>
+            </a:r>
+            <a:r>
+              <a:rPr lang="en-US" dirty="0"/>
+              <a:t> </a:t>
+            </a:r>
+            <a:r>
+              <a:rPr lang="en-US" dirty="0" err="1"/>
+              <a:t>result.out</a:t>
+            </a:r>
+            <a:r>
+              <a:rPr lang="en-US" dirty="0"/>
+              <a:t> somecode1.py </a:t>
+            </a:r>
+          </a:p>
+          <a:p>
+            <a:pPr marL="0" indent="0">
+              <a:buNone/>
             </a:pPr>
             <a:r>
               <a:rPr lang="en-US" dirty="0"/>
@@ -8530,46 +8597,23 @@
             </a:r>
             <a:r>
               <a:rPr lang="en-US" dirty="0" err="1"/>
-              <a:t>pwd</a:t>
+              <a:t>cp</a:t>
             </a:r>
             <a:r>
               <a:rPr lang="en-US" dirty="0"/>
               <a:t> </a:t>
             </a:r>
-          </a:p>
-          <a:p>
-            <a:pPr marL="0" marR="0" lvl="0" indent="0" defTabSz="914400" eaLnBrk="1" fontAlgn="auto" latinLnBrk="0" hangingPunct="1">
-              <a:lnSpc>
-                <a:spcPct val="100000"/>
-              </a:lnSpc>
-              <a:spcBef>
-                <a:spcPts val="0"/>
-              </a:spcBef>
-              <a:spcAft>
-                <a:spcPts val="0"/>
-              </a:spcAft>
-              <a:buClrTx/>
-              <a:buSzTx/>
-              <a:buFontTx/>
-              <a:buNone/>
-              <a:tabLst/>
-              <a:defRPr/>
-            </a:pPr>
-            <a:r>
-              <a:rPr lang="en-US" dirty="0"/>
-              <a:t>	/Users/</a:t>
-            </a:r>
             <a:r>
               <a:rPr lang="en-US" dirty="0" err="1"/>
-              <a:t>BrutusBuckeye</a:t>
-            </a:r>
-            <a:r>
-              <a:rPr lang="en-US" dirty="0"/>
-              <a:t>/Desktop/SURP/</a:t>
+              <a:t>result.out</a:t>
+            </a:r>
+            <a:r>
+              <a:rPr lang="en-US" dirty="0"/>
+              <a:t> </a:t>
             </a:r>
             <a:r>
               <a:rPr lang="en-US" dirty="0" err="1"/>
-              <a:t>bootcamp</a:t>
+              <a:t>copy.out</a:t>
             </a:r>
             <a:r>
               <a:rPr lang="en-US" dirty="0"/>
@@ -8577,88 +8621,45 @@
             </a:r>
           </a:p>
           <a:p>
-            <a:pPr marL="0" marR="0" lvl="0" indent="0" defTabSz="914400" eaLnBrk="1" fontAlgn="auto" latinLnBrk="0" hangingPunct="1">
-              <a:lnSpc>
-                <a:spcPct val="100000"/>
-              </a:lnSpc>
-              <a:spcBef>
-                <a:spcPts val="0"/>
-              </a:spcBef>
-              <a:spcAft>
-                <a:spcPts val="0"/>
-              </a:spcAft>
-              <a:buClrTx/>
-              <a:buSzTx/>
-              <a:buFontTx/>
-              <a:buNone/>
-              <a:tabLst/>
-              <a:defRPr/>
-            </a:pPr>
-            <a:r>
-              <a:rPr lang="en-US" dirty="0"/>
-              <a:t>	$ </a:t>
+            <a:pPr marL="0" indent="0">
+              <a:buNone/>
+            </a:pPr>
+            <a:r>
+              <a:rPr lang="en-US" dirty="0"/>
+              <a:t>	$ ls </a:t>
+            </a:r>
+          </a:p>
+          <a:p>
+            <a:pPr marL="0" indent="0">
+              <a:buNone/>
+            </a:pPr>
+            <a:r>
+              <a:rPr lang="en-US" dirty="0"/>
+              <a:t>	 </a:t>
             </a:r>
             <a:r>
               <a:rPr lang="en-US" dirty="0" err="1"/>
-              <a:t>mkdir</a:t>
-            </a:r>
-            <a:r>
-              <a:rPr lang="en-US" dirty="0"/>
-              <a:t> example </a:t>
-            </a:r>
-          </a:p>
-          <a:p>
-            <a:pPr marL="0" marR="0" lvl="0" indent="0" defTabSz="914400" eaLnBrk="1" fontAlgn="auto" latinLnBrk="0" hangingPunct="1">
-              <a:lnSpc>
-                <a:spcPct val="100000"/>
-              </a:lnSpc>
-              <a:spcBef>
-                <a:spcPts val="0"/>
-              </a:spcBef>
-              <a:spcAft>
-                <a:spcPts val="0"/>
-              </a:spcAft>
-              <a:buClrTx/>
-              <a:buSzTx/>
-              <a:buFontTx/>
-              <a:buNone/>
-              <a:tabLst/>
-              <a:defRPr/>
-            </a:pPr>
-            <a:r>
-              <a:rPr lang="en-US" dirty="0"/>
-              <a:t>	$ ls </a:t>
-            </a:r>
-          </a:p>
-          <a:p>
-            <a:pPr marL="0" marR="0" lvl="0" indent="0" defTabSz="914400" eaLnBrk="1" fontAlgn="auto" latinLnBrk="0" hangingPunct="1">
-              <a:lnSpc>
-                <a:spcPct val="100000"/>
-              </a:lnSpc>
-              <a:spcBef>
-                <a:spcPts val="0"/>
-              </a:spcBef>
-              <a:spcAft>
-                <a:spcPts val="0"/>
-              </a:spcAft>
-              <a:buClrTx/>
-              <a:buSzTx/>
-              <a:buFontTx/>
-              <a:buNone/>
-              <a:tabLst/>
-              <a:defRPr/>
-            </a:pPr>
-            <a:r>
-              <a:rPr lang="en-US" dirty="0"/>
-              <a:t>	example exercises notes slides </a:t>
+              <a:t>copy.out</a:t>
+            </a:r>
+            <a:r>
+              <a:rPr lang="en-US" dirty="0"/>
+              <a:t> </a:t>
             </a:r>
             <a:r>
               <a:rPr lang="en-US" dirty="0" err="1"/>
-              <a:t>somecode.py</a:t>
+              <a:t>data.dat</a:t>
             </a:r>
             <a:r>
               <a:rPr lang="en-US" dirty="0"/>
               <a:t> </a:t>
+            </a:r>
+            <a:r>
+              <a:rPr lang="en-US" dirty="0" err="1"/>
+              <a:t>result.out</a:t>
+            </a:r>
+            <a:r>
+              <a:rPr lang="en-US" dirty="0"/>
+              <a:t> somecode1.py </a:t>
             </a:r>
           </a:p>
         </p:txBody>
@@ -8666,7 +8667,7 @@
     </p:spTree>
     <p:extLst>
       <p:ext uri="{BB962C8B-B14F-4D97-AF65-F5344CB8AC3E}">
-        <p14:creationId xmlns:p14="http://schemas.microsoft.com/office/powerpoint/2010/main" val="1594207643"/>
+        <p14:creationId xmlns:p14="http://schemas.microsoft.com/office/powerpoint/2010/main" val="133284566"/>
       </p:ext>
     </p:extLst>
   </p:cSld>
@@ -8710,19 +8711,11 @@
           <a:p>
             <a:r>
               <a:rPr lang="en-US" i="1" dirty="0" err="1"/>
-              <a:t>rm</a:t>
-            </a:r>
-            <a:r>
-              <a:rPr lang="en-US" dirty="0"/>
-              <a:t>: Remove [</a:t>
-            </a:r>
-            <a:r>
-              <a:rPr lang="en-US" i="1" dirty="0"/>
-              <a:t>del</a:t>
-            </a:r>
-            <a:r>
-              <a:rPr lang="en-US" dirty="0"/>
-              <a:t>] </a:t>
+              <a:t>mkdir</a:t>
+            </a:r>
+            <a:r>
+              <a:rPr lang="en-US" dirty="0"/>
+              <a:t>: Make Directory </a:t>
             </a:r>
             <a:endParaRPr lang="en-US" i="1" dirty="0"/>
           </a:p>
@@ -8738,12 +8731,7 @@
             <p:ph idx="1"/>
           </p:nvPr>
         </p:nvSpPr>
-        <p:spPr>
-          <a:xfrm>
-            <a:off x="680321" y="2336872"/>
-            <a:ext cx="10674616" cy="3941097"/>
-          </a:xfrm>
-        </p:spPr>
+        <p:spPr/>
         <p:txBody>
           <a:bodyPr/>
           <a:lstStyle/>
@@ -8767,15 +8755,7 @@
             </a:pPr>
             <a:r>
               <a:rPr lang="en-US" dirty="0"/>
-              <a:t>Remove a file from system memory (careful </a:t>
-            </a:r>
-            <a:r>
-              <a:rPr lang="mr-IN" dirty="0"/>
-              <a:t>–</a:t>
-            </a:r>
-            <a:r>
-              <a:rPr lang="en-US" dirty="0"/>
-              <a:t> this doesn’t move a file to trash)</a:t>
+              <a:t>Create a new directory (same as clicking “New Folder” in a Finder window) </a:t>
             </a:r>
           </a:p>
           <a:p>
@@ -8802,11 +8782,11 @@
             </a:r>
             <a:r>
               <a:rPr lang="en-US" i="1" dirty="0" err="1"/>
-              <a:t>rm</a:t>
+              <a:t>mkdir</a:t>
             </a:r>
             <a:r>
               <a:rPr lang="en-US" i="1" dirty="0"/>
-              <a:t> [filename] </a:t>
+              <a:t> [directory name] </a:t>
             </a:r>
             <a:endParaRPr lang="en-US" dirty="0"/>
           </a:p>
@@ -8873,7 +8853,15 @@
             </a:pPr>
             <a:r>
               <a:rPr lang="en-US" dirty="0"/>
-              <a:t>	$ ls </a:t>
+              <a:t>	$ </a:t>
+            </a:r>
+            <a:r>
+              <a:rPr lang="en-US" dirty="0" err="1"/>
+              <a:t>pwd</a:t>
+            </a:r>
+            <a:r>
+              <a:rPr lang="en-US" dirty="0"/>
+              <a:t> </a:t>
             </a:r>
           </a:p>
           <a:p>
@@ -8896,11 +8884,19 @@
             </a:pPr>
             <a:r>
               <a:rPr lang="en-US" dirty="0"/>
-              <a:t>	goodcode1.py goodcode2.py </a:t>
+              <a:t>	/Users/</a:t>
             </a:r>
             <a:r>
               <a:rPr lang="en-US" dirty="0" err="1"/>
-              <a:t>badcode.py</a:t>
+              <a:t>BrutusBuckeye</a:t>
+            </a:r>
+            <a:r>
+              <a:rPr lang="en-US" dirty="0"/>
+              <a:t>/Desktop/SURP/</a:t>
+            </a:r>
+            <a:r>
+              <a:rPr lang="en-US" dirty="0" err="1"/>
+              <a:t>bootcamp</a:t>
             </a:r>
             <a:r>
               <a:rPr lang="en-US" dirty="0"/>
@@ -8931,19 +8927,11 @@
             </a:r>
             <a:r>
               <a:rPr lang="en-US" dirty="0" err="1"/>
-              <a:t>rm</a:t>
-            </a:r>
-            <a:r>
-              <a:rPr lang="en-US" dirty="0"/>
-              <a:t> </a:t>
-            </a:r>
-            <a:r>
-              <a:rPr lang="en-US" dirty="0" err="1"/>
-              <a:t>badcode.py</a:t>
-            </a:r>
-            <a:r>
-              <a:rPr lang="en-US" dirty="0"/>
-              <a:t> </a:t>
+              <a:t>mkdir</a:t>
+            </a:r>
+            <a:r>
+              <a:rPr lang="en-US" dirty="0"/>
+              <a:t> example </a:t>
             </a:r>
           </a:p>
           <a:p>
@@ -8989,7 +8977,15 @@
             </a:pPr>
             <a:r>
               <a:rPr lang="en-US" dirty="0"/>
-              <a:t>	goodcode1.py goodcode2.py </a:t>
+              <a:t>	example exercises notes slides </a:t>
+            </a:r>
+            <a:r>
+              <a:rPr lang="en-US" dirty="0" err="1"/>
+              <a:t>somecode.py</a:t>
+            </a:r>
+            <a:r>
+              <a:rPr lang="en-US" dirty="0"/>
+              <a:t> </a:t>
             </a:r>
           </a:p>
         </p:txBody>
@@ -8997,7 +8993,7 @@
     </p:spTree>
     <p:extLst>
       <p:ext uri="{BB962C8B-B14F-4D97-AF65-F5344CB8AC3E}">
-        <p14:creationId xmlns:p14="http://schemas.microsoft.com/office/powerpoint/2010/main" val="1429540826"/>
+        <p14:creationId xmlns:p14="http://schemas.microsoft.com/office/powerpoint/2010/main" val="1594207643"/>
       </p:ext>
     </p:extLst>
   </p:cSld>
@@ -9034,27 +9030,22 @@
             <p:ph type="title"/>
           </p:nvPr>
         </p:nvSpPr>
-        <p:spPr>
-          <a:xfrm>
-            <a:off x="693969" y="753228"/>
-            <a:ext cx="9613861" cy="1080938"/>
-          </a:xfrm>
-        </p:spPr>
+        <p:spPr/>
         <p:txBody>
           <a:bodyPr/>
           <a:lstStyle/>
           <a:p>
             <a:r>
+              <a:rPr lang="en-US" i="1" dirty="0" err="1"/>
+              <a:t>rm</a:t>
+            </a:r>
+            <a:r>
+              <a:rPr lang="en-US" dirty="0"/>
+              <a:t>: Remove [</a:t>
+            </a:r>
+            <a:r>
               <a:rPr lang="en-US" i="1" dirty="0"/>
-              <a:t>man</a:t>
-            </a:r>
-            <a:r>
-              <a:rPr lang="en-US" dirty="0"/>
-              <a:t>: Manual [</a:t>
-            </a:r>
-            <a:r>
-              <a:rPr lang="en-US" i="1" dirty="0"/>
-              <a:t>&lt;command&gt;/?</a:t>
+              <a:t>del</a:t>
             </a:r>
             <a:r>
               <a:rPr lang="en-US" dirty="0"/>
@@ -9074,7 +9065,12 @@
             <p:ph idx="1"/>
           </p:nvPr>
         </p:nvSpPr>
-        <p:spPr/>
+        <p:spPr>
+          <a:xfrm>
+            <a:off x="680321" y="2336872"/>
+            <a:ext cx="10674616" cy="3941097"/>
+          </a:xfrm>
+        </p:spPr>
         <p:txBody>
           <a:bodyPr/>
           <a:lstStyle/>
@@ -9098,7 +9094,15 @@
             </a:pPr>
             <a:r>
               <a:rPr lang="en-US" dirty="0"/>
-              <a:t>Pulls up the manual entry (i.e. documentation) for a given terminal command  </a:t>
+              <a:t>Remove a file from system memory (careful </a:t>
+            </a:r>
+            <a:r>
+              <a:rPr lang="mr-IN" dirty="0"/>
+              <a:t>–</a:t>
+            </a:r>
+            <a:r>
+              <a:rPr lang="en-US" dirty="0"/>
+              <a:t> this doesn’t move a file to trash)</a:t>
             </a:r>
           </a:p>
           <a:p>
@@ -9121,8 +9125,17 @@
             </a:pPr>
             <a:r>
               <a:rPr lang="en-US" dirty="0"/>
-              <a:t>Can be used as a reference on what “flags” each command takes </a:t>
-            </a:r>
+              <a:t>Usage: </a:t>
+            </a:r>
+            <a:r>
+              <a:rPr lang="en-US" i="1" dirty="0" err="1"/>
+              <a:t>rm</a:t>
+            </a:r>
+            <a:r>
+              <a:rPr lang="en-US" i="1" dirty="0"/>
+              <a:t> [filename] </a:t>
+            </a:r>
+            <a:endParaRPr lang="en-US" dirty="0"/>
           </a:p>
           <a:p>
             <a:pPr marL="0" marR="0" lvl="0" indent="0" defTabSz="914400" eaLnBrk="1" fontAlgn="auto" latinLnBrk="0" hangingPunct="1">
@@ -9142,18 +9155,7 @@
               <a:tabLst/>
               <a:defRPr/>
             </a:pPr>
-            <a:r>
-              <a:rPr lang="en-US" dirty="0"/>
-              <a:t>Press Q to exit a </a:t>
-            </a:r>
-            <a:r>
-              <a:rPr lang="en-US" i="1" dirty="0"/>
-              <a:t>man</a:t>
-            </a:r>
-            <a:r>
-              <a:rPr lang="en-US" dirty="0"/>
-              <a:t> page </a:t>
-            </a:r>
+            <a:endParaRPr lang="en-US" dirty="0"/>
           </a:p>
           <a:p>
             <a:pPr marL="0" marR="0" lvl="0" indent="0" defTabSz="914400" eaLnBrk="1" fontAlgn="auto" latinLnBrk="0" hangingPunct="1">
@@ -9173,7 +9175,10 @@
               <a:tabLst/>
               <a:defRPr/>
             </a:pPr>
-            <a:endParaRPr lang="en-US" dirty="0"/>
+            <a:r>
+              <a:rPr lang="en-US" dirty="0"/>
+              <a:t>Example: </a:t>
+            </a:r>
           </a:p>
           <a:p>
             <a:pPr marL="0" marR="0" lvl="0" indent="0" defTabSz="914400" eaLnBrk="1" fontAlgn="auto" latinLnBrk="0" hangingPunct="1">
@@ -9195,7 +9200,7 @@
             </a:pPr>
             <a:r>
               <a:rPr lang="en-US" dirty="0"/>
-              <a:t>Example: </a:t>
+              <a:t>	$ ls </a:t>
             </a:r>
           </a:p>
           <a:p>
@@ -9218,7 +9223,15 @@
             </a:pPr>
             <a:r>
               <a:rPr lang="en-US" dirty="0"/>
-              <a:t>	$ man ls [ls/?] </a:t>
+              <a:t>	goodcode1.py goodcode2.py </a:t>
+            </a:r>
+            <a:r>
+              <a:rPr lang="en-US" dirty="0" err="1"/>
+              <a:t>badcode.py</a:t>
+            </a:r>
+            <a:r>
+              <a:rPr lang="en-US" dirty="0"/>
+              <a:t> </a:t>
             </a:r>
           </a:p>
           <a:p>
@@ -9241,7 +9254,23 @@
             </a:pPr>
             <a:r>
               <a:rPr lang="en-US" dirty="0"/>
-              <a:t>	$ man mv [mv/?] </a:t>
+              <a:t>	$ </a:t>
+            </a:r>
+            <a:r>
+              <a:rPr lang="en-US" dirty="0" err="1"/>
+              <a:t>rm</a:t>
+            </a:r>
+            <a:r>
+              <a:rPr lang="en-US" dirty="0"/>
+              <a:t> </a:t>
+            </a:r>
+            <a:r>
+              <a:rPr lang="en-US" dirty="0" err="1"/>
+              <a:t>badcode.py</a:t>
+            </a:r>
+            <a:r>
+              <a:rPr lang="en-US" dirty="0"/>
+              <a:t> </a:t>
             </a:r>
           </a:p>
           <a:p>
@@ -9264,23 +9293,30 @@
             </a:pPr>
             <a:r>
               <a:rPr lang="en-US" dirty="0"/>
-              <a:t>	$ man </a:t>
-            </a:r>
-            <a:r>
-              <a:rPr lang="en-US" dirty="0" err="1"/>
-              <a:t>pwd</a:t>
-            </a:r>
-            <a:r>
-              <a:rPr lang="en-US" dirty="0"/>
-              <a:t> [</a:t>
-            </a:r>
-            <a:r>
-              <a:rPr lang="en-US" dirty="0" err="1"/>
-              <a:t>pwd</a:t>
-            </a:r>
-            <a:r>
-              <a:rPr lang="en-US" dirty="0"/>
-              <a:t>/?] </a:t>
+              <a:t>	$ ls </a:t>
+            </a:r>
+          </a:p>
+          <a:p>
+            <a:pPr marL="0" marR="0" lvl="0" indent="0" defTabSz="914400" eaLnBrk="1" fontAlgn="auto" latinLnBrk="0" hangingPunct="1">
+              <a:lnSpc>
+                <a:spcPct val="100000"/>
+              </a:lnSpc>
+              <a:spcBef>
+                <a:spcPts val="0"/>
+              </a:spcBef>
+              <a:spcAft>
+                <a:spcPts val="0"/>
+              </a:spcAft>
+              <a:buClrTx/>
+              <a:buSzTx/>
+              <a:buFontTx/>
+              <a:buNone/>
+              <a:tabLst/>
+              <a:defRPr/>
+            </a:pPr>
+            <a:r>
+              <a:rPr lang="en-US" dirty="0"/>
+              <a:t>	goodcode1.py goodcode2.py </a:t>
             </a:r>
           </a:p>
         </p:txBody>
@@ -9288,7 +9324,7 @@
     </p:spTree>
     <p:extLst>
       <p:ext uri="{BB962C8B-B14F-4D97-AF65-F5344CB8AC3E}">
-        <p14:creationId xmlns:p14="http://schemas.microsoft.com/office/powerpoint/2010/main" val="664730687"/>
+        <p14:creationId xmlns:p14="http://schemas.microsoft.com/office/powerpoint/2010/main" val="1429540826"/>
       </p:ext>
     </p:extLst>
   </p:cSld>
@@ -9325,15 +9361,33 @@
             <p:ph type="title"/>
           </p:nvPr>
         </p:nvSpPr>
-        <p:spPr/>
+        <p:spPr>
+          <a:xfrm>
+            <a:off x="693969" y="753228"/>
+            <a:ext cx="9613861" cy="1080938"/>
+          </a:xfrm>
+        </p:spPr>
         <p:txBody>
           <a:bodyPr/>
           <a:lstStyle/>
           <a:p>
             <a:r>
-              <a:rPr lang="en-US" dirty="0"/>
-              <a:t>*: All Files </a:t>
-            </a:r>
+              <a:rPr lang="en-US" i="1" dirty="0"/>
+              <a:t>man</a:t>
+            </a:r>
+            <a:r>
+              <a:rPr lang="en-US" dirty="0"/>
+              <a:t>: Manual [</a:t>
+            </a:r>
+            <a:r>
+              <a:rPr lang="en-US" i="1" dirty="0"/>
+              <a:t>&lt;command&gt;/?</a:t>
+            </a:r>
+            <a:r>
+              <a:rPr lang="en-US" dirty="0"/>
+              <a:t>] </a:t>
+            </a:r>
+            <a:endParaRPr lang="en-US" i="1" dirty="0"/>
           </a:p>
         </p:txBody>
       </p:sp>
@@ -9347,12 +9401,7 @@
             <p:ph idx="1"/>
           </p:nvPr>
         </p:nvSpPr>
-        <p:spPr>
-          <a:xfrm>
-            <a:off x="680321" y="2323225"/>
-            <a:ext cx="9613861" cy="4254996"/>
-          </a:xfrm>
-        </p:spPr>
+        <p:spPr/>
         <p:txBody>
           <a:bodyPr/>
           <a:lstStyle/>
@@ -9376,7 +9425,7 @@
             </a:pPr>
             <a:r>
               <a:rPr lang="en-US" dirty="0"/>
-              <a:t>An asterisk (*) refers to all files in a given directory, and can be modified to refer to only those with a specific prefix or suffix </a:t>
+              <a:t>Pulls up the manual entry (i.e. documentation) for a given terminal command  </a:t>
             </a:r>
           </a:p>
           <a:p>
@@ -9397,7 +9446,10 @@
               <a:tabLst/>
               <a:defRPr/>
             </a:pPr>
-            <a:endParaRPr lang="en-US" dirty="0"/>
+            <a:r>
+              <a:rPr lang="en-US" dirty="0"/>
+              <a:t>Can be used as a reference on what “flags” each command takes </a:t>
+            </a:r>
           </a:p>
           <a:p>
             <a:pPr marL="0" marR="0" lvl="0" indent="0" defTabSz="914400" eaLnBrk="1" fontAlgn="auto" latinLnBrk="0" hangingPunct="1">
@@ -9419,7 +9471,15 @@
             </a:pPr>
             <a:r>
               <a:rPr lang="en-US" dirty="0"/>
-              <a:t>Example: </a:t>
+              <a:t>Press Q to exit a </a:t>
+            </a:r>
+            <a:r>
+              <a:rPr lang="en-US" i="1" dirty="0"/>
+              <a:t>man</a:t>
+            </a:r>
+            <a:r>
+              <a:rPr lang="en-US" dirty="0"/>
+              <a:t> page </a:t>
             </a:r>
           </a:p>
           <a:p>
@@ -9440,10 +9500,7 @@
               <a:tabLst/>
               <a:defRPr/>
             </a:pPr>
-            <a:r>
-              <a:rPr lang="en-US" dirty="0"/>
-              <a:t>	$ ls </a:t>
-            </a:r>
+            <a:endParaRPr lang="en-US" dirty="0"/>
           </a:p>
           <a:p>
             <a:pPr marL="0" marR="0" lvl="0" indent="0" defTabSz="914400" eaLnBrk="1" fontAlgn="auto" latinLnBrk="0" hangingPunct="1">
@@ -9465,31 +9522,7 @@
             </a:pPr>
             <a:r>
               <a:rPr lang="en-US" dirty="0"/>
-              <a:t>	</a:t>
-            </a:r>
-            <a:r>
-              <a:rPr lang="en-US" dirty="0" err="1"/>
-              <a:t>somedata.dat</a:t>
-            </a:r>
-            <a:r>
-              <a:rPr lang="en-US" dirty="0"/>
-              <a:t> </a:t>
-            </a:r>
-            <a:r>
-              <a:rPr lang="en-US" dirty="0" err="1"/>
-              <a:t>somecode.py</a:t>
-            </a:r>
-            <a:r>
-              <a:rPr lang="en-US" dirty="0"/>
-              <a:t> </a:t>
-            </a:r>
-            <a:r>
-              <a:rPr lang="en-US" dirty="0" err="1"/>
-              <a:t>someoutput.out</a:t>
-            </a:r>
-            <a:r>
-              <a:rPr lang="en-US" dirty="0"/>
-              <a:t> </a:t>
+              <a:t>Example: </a:t>
             </a:r>
           </a:p>
           <a:p>
@@ -9512,15 +9545,7 @@
             </a:pPr>
             <a:r>
               <a:rPr lang="en-US" dirty="0"/>
-              <a:t>	$ ls *.</a:t>
-            </a:r>
-            <a:r>
-              <a:rPr lang="en-US" dirty="0" err="1"/>
-              <a:t>py</a:t>
-            </a:r>
-            <a:r>
-              <a:rPr lang="en-US" dirty="0"/>
-              <a:t> </a:t>
+              <a:t>	$ man ls [ls/?] </a:t>
             </a:r>
           </a:p>
           <a:p>
@@ -9543,15 +9568,7 @@
             </a:pPr>
             <a:r>
               <a:rPr lang="en-US" dirty="0"/>
-              <a:t>	</a:t>
-            </a:r>
-            <a:r>
-              <a:rPr lang="en-US" dirty="0" err="1"/>
-              <a:t>somecode.py</a:t>
-            </a:r>
-            <a:r>
-              <a:rPr lang="en-US" dirty="0"/>
-              <a:t> </a:t>
+              <a:t>	$ man mv [mv/?] </a:t>
             </a:r>
           </a:p>
           <a:p>
@@ -9574,74 +9591,31 @@
             </a:pPr>
             <a:r>
               <a:rPr lang="en-US" dirty="0"/>
-              <a:t>	$ ls some* </a:t>
-            </a:r>
-          </a:p>
-          <a:p>
-            <a:pPr marL="0" indent="0">
-              <a:lnSpc>
-                <a:spcPct val="100000"/>
-              </a:lnSpc>
-              <a:spcBef>
-                <a:spcPts val="0"/>
-              </a:spcBef>
-              <a:buNone/>
-            </a:pPr>
-            <a:r>
-              <a:rPr lang="en-US" dirty="0"/>
-              <a:t>	</a:t>
+              <a:t>	$ man </a:t>
             </a:r>
             <a:r>
               <a:rPr lang="en-US" dirty="0" err="1"/>
-              <a:t>somedata.dat</a:t>
-            </a:r>
-            <a:r>
-              <a:rPr lang="en-US" dirty="0"/>
-              <a:t> </a:t>
+              <a:t>pwd</a:t>
+            </a:r>
+            <a:r>
+              <a:rPr lang="en-US" dirty="0"/>
+              <a:t> [</a:t>
             </a:r>
             <a:r>
               <a:rPr lang="en-US" dirty="0" err="1"/>
-              <a:t>somecode.py</a:t>
-            </a:r>
-            <a:r>
-              <a:rPr lang="en-US" dirty="0"/>
-              <a:t> </a:t>
-            </a:r>
-            <a:r>
-              <a:rPr lang="en-US" dirty="0" err="1"/>
-              <a:t>someoutput.out</a:t>
-            </a:r>
-            <a:r>
-              <a:rPr lang="en-US" dirty="0"/>
-              <a:t> </a:t>
-            </a:r>
-          </a:p>
-          <a:p>
-            <a:pPr marL="0" marR="0" lvl="0" indent="0" defTabSz="914400" eaLnBrk="1" fontAlgn="auto" latinLnBrk="0" hangingPunct="1">
-              <a:lnSpc>
-                <a:spcPct val="100000"/>
-              </a:lnSpc>
-              <a:spcBef>
-                <a:spcPts val="0"/>
-              </a:spcBef>
-              <a:spcAft>
-                <a:spcPts val="0"/>
-              </a:spcAft>
-              <a:buClrTx/>
-              <a:buSzTx/>
-              <a:buFontTx/>
-              <a:buNone/>
-              <a:tabLst/>
-              <a:defRPr/>
-            </a:pPr>
-            <a:endParaRPr lang="en-US" dirty="0"/>
+              <a:t>pwd</a:t>
+            </a:r>
+            <a:r>
+              <a:rPr lang="en-US" dirty="0"/>
+              <a:t>/?] </a:t>
+            </a:r>
           </a:p>
         </p:txBody>
       </p:sp>
     </p:spTree>
     <p:extLst>
       <p:ext uri="{BB962C8B-B14F-4D97-AF65-F5344CB8AC3E}">
-        <p14:creationId xmlns:p14="http://schemas.microsoft.com/office/powerpoint/2010/main" val="691502808"/>
+        <p14:creationId xmlns:p14="http://schemas.microsoft.com/office/powerpoint/2010/main" val="664730687"/>
       </p:ext>
     </p:extLst>
   </p:cSld>
@@ -9685,7 +9659,7 @@
           <a:p>
             <a:r>
               <a:rPr lang="en-US" dirty="0"/>
-              <a:t>The Bash Profile </a:t>
+              <a:t>*: All Files </a:t>
             </a:r>
           </a:p>
         </p:txBody>
@@ -9702,145 +9676,299 @@
         </p:nvSpPr>
         <p:spPr>
           <a:xfrm>
-            <a:off x="680321" y="2336872"/>
-            <a:ext cx="9613861" cy="4521128"/>
-          </a:xfrm>
-        </p:spPr>
-        <p:txBody>
-          <a:bodyPr>
-            <a:normAutofit/>
-          </a:bodyPr>
+            <a:off x="680321" y="2323225"/>
+            <a:ext cx="9613861" cy="4254996"/>
+          </a:xfrm>
+        </p:spPr>
+        <p:txBody>
+          <a:bodyPr/>
           <a:lstStyle/>
           <a:p>
+            <a:pPr marL="0" marR="0" lvl="0" indent="0" defTabSz="914400" eaLnBrk="1" fontAlgn="auto" latinLnBrk="0" hangingPunct="1">
+              <a:lnSpc>
+                <a:spcPct val="100000"/>
+              </a:lnSpc>
+              <a:spcBef>
+                <a:spcPts val="0"/>
+              </a:spcBef>
+              <a:spcAft>
+                <a:spcPts val="0"/>
+              </a:spcAft>
+              <a:buClrTx/>
+              <a:buSzTx/>
+              <a:buFontTx/>
+              <a:buNone/>
+              <a:tabLst/>
+              <a:defRPr/>
+            </a:pPr>
+            <a:r>
+              <a:rPr lang="en-US" dirty="0"/>
+              <a:t>An asterisk (*) refers to all files in a given directory, and can be modified to refer to only those with a specific prefix or suffix </a:t>
+            </a:r>
+          </a:p>
+          <a:p>
+            <a:pPr marL="0" marR="0" lvl="0" indent="0" defTabSz="914400" eaLnBrk="1" fontAlgn="auto" latinLnBrk="0" hangingPunct="1">
+              <a:lnSpc>
+                <a:spcPct val="100000"/>
+              </a:lnSpc>
+              <a:spcBef>
+                <a:spcPts val="0"/>
+              </a:spcBef>
+              <a:spcAft>
+                <a:spcPts val="0"/>
+              </a:spcAft>
+              <a:buClrTx/>
+              <a:buSzTx/>
+              <a:buFontTx/>
+              <a:buNone/>
+              <a:tabLst/>
+              <a:defRPr/>
+            </a:pPr>
+            <a:endParaRPr lang="en-US" dirty="0"/>
+          </a:p>
+          <a:p>
+            <a:pPr marL="0" marR="0" lvl="0" indent="0" defTabSz="914400" eaLnBrk="1" fontAlgn="auto" latinLnBrk="0" hangingPunct="1">
+              <a:lnSpc>
+                <a:spcPct val="100000"/>
+              </a:lnSpc>
+              <a:spcBef>
+                <a:spcPts val="0"/>
+              </a:spcBef>
+              <a:spcAft>
+                <a:spcPts val="0"/>
+              </a:spcAft>
+              <a:buClrTx/>
+              <a:buSzTx/>
+              <a:buFontTx/>
+              <a:buNone/>
+              <a:tabLst/>
+              <a:defRPr/>
+            </a:pPr>
+            <a:r>
+              <a:rPr lang="en-US" dirty="0"/>
+              <a:t>Example: </a:t>
+            </a:r>
+          </a:p>
+          <a:p>
+            <a:pPr marL="0" marR="0" lvl="0" indent="0" defTabSz="914400" eaLnBrk="1" fontAlgn="auto" latinLnBrk="0" hangingPunct="1">
+              <a:lnSpc>
+                <a:spcPct val="100000"/>
+              </a:lnSpc>
+              <a:spcBef>
+                <a:spcPts val="0"/>
+              </a:spcBef>
+              <a:spcAft>
+                <a:spcPts val="0"/>
+              </a:spcAft>
+              <a:buClrTx/>
+              <a:buSzTx/>
+              <a:buFontTx/>
+              <a:buNone/>
+              <a:tabLst/>
+              <a:defRPr/>
+            </a:pPr>
+            <a:r>
+              <a:rPr lang="en-US" dirty="0"/>
+              <a:t>	$ ls </a:t>
+            </a:r>
+          </a:p>
+          <a:p>
+            <a:pPr marL="0" marR="0" lvl="0" indent="0" defTabSz="914400" eaLnBrk="1" fontAlgn="auto" latinLnBrk="0" hangingPunct="1">
+              <a:lnSpc>
+                <a:spcPct val="100000"/>
+              </a:lnSpc>
+              <a:spcBef>
+                <a:spcPts val="0"/>
+              </a:spcBef>
+              <a:spcAft>
+                <a:spcPts val="0"/>
+              </a:spcAft>
+              <a:buClrTx/>
+              <a:buSzTx/>
+              <a:buFontTx/>
+              <a:buNone/>
+              <a:tabLst/>
+              <a:defRPr/>
+            </a:pPr>
+            <a:r>
+              <a:rPr lang="en-US" dirty="0"/>
+              <a:t>	</a:t>
+            </a:r>
+            <a:r>
+              <a:rPr lang="en-US" dirty="0" err="1"/>
+              <a:t>somedata.dat</a:t>
+            </a:r>
+            <a:r>
+              <a:rPr lang="en-US" dirty="0"/>
+              <a:t> </a:t>
+            </a:r>
+            <a:r>
+              <a:rPr lang="en-US" dirty="0" err="1"/>
+              <a:t>somecode.py</a:t>
+            </a:r>
+            <a:r>
+              <a:rPr lang="en-US" dirty="0"/>
+              <a:t> </a:t>
+            </a:r>
+            <a:r>
+              <a:rPr lang="en-US" dirty="0" err="1"/>
+              <a:t>someoutput.out</a:t>
+            </a:r>
+            <a:r>
+              <a:rPr lang="en-US" dirty="0"/>
+              <a:t> </a:t>
+            </a:r>
+          </a:p>
+          <a:p>
+            <a:pPr marL="0" marR="0" lvl="0" indent="0" defTabSz="914400" eaLnBrk="1" fontAlgn="auto" latinLnBrk="0" hangingPunct="1">
+              <a:lnSpc>
+                <a:spcPct val="100000"/>
+              </a:lnSpc>
+              <a:spcBef>
+                <a:spcPts val="0"/>
+              </a:spcBef>
+              <a:spcAft>
+                <a:spcPts val="0"/>
+              </a:spcAft>
+              <a:buClrTx/>
+              <a:buSzTx/>
+              <a:buFontTx/>
+              <a:buNone/>
+              <a:tabLst/>
+              <a:defRPr/>
+            </a:pPr>
+            <a:r>
+              <a:rPr lang="en-US" dirty="0"/>
+              <a:t>	$ ls *.</a:t>
+            </a:r>
+            <a:r>
+              <a:rPr lang="en-US" dirty="0" err="1"/>
+              <a:t>py</a:t>
+            </a:r>
+            <a:r>
+              <a:rPr lang="en-US" dirty="0"/>
+              <a:t> </a:t>
+            </a:r>
+          </a:p>
+          <a:p>
+            <a:pPr marL="0" marR="0" lvl="0" indent="0" defTabSz="914400" eaLnBrk="1" fontAlgn="auto" latinLnBrk="0" hangingPunct="1">
+              <a:lnSpc>
+                <a:spcPct val="100000"/>
+              </a:lnSpc>
+              <a:spcBef>
+                <a:spcPts val="0"/>
+              </a:spcBef>
+              <a:spcAft>
+                <a:spcPts val="0"/>
+              </a:spcAft>
+              <a:buClrTx/>
+              <a:buSzTx/>
+              <a:buFontTx/>
+              <a:buNone/>
+              <a:tabLst/>
+              <a:defRPr/>
+            </a:pPr>
+            <a:r>
+              <a:rPr lang="en-US" dirty="0"/>
+              <a:t>	</a:t>
+            </a:r>
+            <a:r>
+              <a:rPr lang="en-US" dirty="0" err="1"/>
+              <a:t>somecode.py</a:t>
+            </a:r>
+            <a:r>
+              <a:rPr lang="en-US" dirty="0"/>
+              <a:t> </a:t>
+            </a:r>
+          </a:p>
+          <a:p>
+            <a:pPr marL="0" marR="0" lvl="0" indent="0" defTabSz="914400" eaLnBrk="1" fontAlgn="auto" latinLnBrk="0" hangingPunct="1">
+              <a:lnSpc>
+                <a:spcPct val="100000"/>
+              </a:lnSpc>
+              <a:spcBef>
+                <a:spcPts val="0"/>
+              </a:spcBef>
+              <a:spcAft>
+                <a:spcPts val="0"/>
+              </a:spcAft>
+              <a:buClrTx/>
+              <a:buSzTx/>
+              <a:buFontTx/>
+              <a:buNone/>
+              <a:tabLst/>
+              <a:defRPr/>
+            </a:pPr>
+            <a:r>
+              <a:rPr lang="en-US" dirty="0"/>
+              <a:t>	$ ls some* </a:t>
+            </a:r>
+          </a:p>
+          <a:p>
             <a:pPr marL="0" indent="0">
-              <a:buNone/>
-            </a:pPr>
-            <a:r>
-              <a:rPr lang="en-US" dirty="0"/>
-              <a:t>A particular file located at ~/.</a:t>
+              <a:lnSpc>
+                <a:spcPct val="100000"/>
+              </a:lnSpc>
+              <a:spcBef>
+                <a:spcPts val="0"/>
+              </a:spcBef>
+              <a:buNone/>
+            </a:pPr>
+            <a:r>
+              <a:rPr lang="en-US" dirty="0"/>
+              <a:t>	</a:t>
             </a:r>
             <a:r>
               <a:rPr lang="en-US" dirty="0" err="1"/>
-              <a:t>bash_profile</a:t>
-            </a:r>
-            <a:r>
-              <a:rPr lang="en-US" dirty="0"/>
-              <a:t> (can also use ~/.</a:t>
+              <a:t>somedata.dat</a:t>
+            </a:r>
+            <a:r>
+              <a:rPr lang="en-US" dirty="0"/>
+              <a:t> </a:t>
             </a:r>
             <a:r>
               <a:rPr lang="en-US" dirty="0" err="1"/>
-              <a:t>bashrc</a:t>
-            </a:r>
-            <a:r>
-              <a:rPr lang="en-US" dirty="0"/>
-              <a:t>) </a:t>
-            </a:r>
-          </a:p>
-          <a:p>
-            <a:pPr marL="0" indent="0">
-              <a:buNone/>
+              <a:t>somecode.py</a:t>
+            </a:r>
+            <a:r>
+              <a:rPr lang="en-US" dirty="0"/>
+              <a:t> </a:t>
+            </a:r>
+            <a:r>
+              <a:rPr lang="en-US" dirty="0" err="1"/>
+              <a:t>someoutput.out</a:t>
+            </a:r>
+            <a:r>
+              <a:rPr lang="en-US" dirty="0"/>
+              <a:t> </a:t>
+            </a:r>
+          </a:p>
+          <a:p>
+            <a:pPr marL="0" marR="0" lvl="0" indent="0" defTabSz="914400" eaLnBrk="1" fontAlgn="auto" latinLnBrk="0" hangingPunct="1">
+              <a:lnSpc>
+                <a:spcPct val="100000"/>
+              </a:lnSpc>
+              <a:spcBef>
+                <a:spcPts val="0"/>
+              </a:spcBef>
+              <a:spcAft>
+                <a:spcPts val="0"/>
+              </a:spcAft>
+              <a:buClrTx/>
+              <a:buSzTx/>
+              <a:buFontTx/>
+              <a:buNone/>
+              <a:tabLst/>
+              <a:defRPr/>
             </a:pPr>
             <a:endParaRPr lang="en-US" dirty="0"/>
-          </a:p>
-          <a:p>
-            <a:pPr marL="0" indent="0">
-              <a:buNone/>
-            </a:pPr>
-            <a:r>
-              <a:rPr lang="en-US" dirty="0"/>
-              <a:t>Typically contains</a:t>
-            </a:r>
-            <a:r>
-              <a:rPr lang="mr-IN" dirty="0"/>
-              <a:t>…</a:t>
-            </a:r>
-            <a:r>
-              <a:rPr lang="en-US" dirty="0"/>
-              <a:t> </a:t>
-            </a:r>
-          </a:p>
-          <a:p>
-            <a:pPr lvl="1"/>
-            <a:r>
-              <a:rPr lang="en-US" dirty="0"/>
-              <a:t>Environment variables </a:t>
-            </a:r>
-          </a:p>
-          <a:p>
-            <a:pPr lvl="1"/>
-            <a:r>
-              <a:rPr lang="en-US" dirty="0"/>
-              <a:t>Aliases </a:t>
-            </a:r>
-          </a:p>
-          <a:p>
-            <a:pPr lvl="1"/>
-            <a:r>
-              <a:rPr lang="en-US" dirty="0"/>
-              <a:t>Modifications to your PATH or PYTHONPATH </a:t>
-            </a:r>
-          </a:p>
-          <a:p>
-            <a:pPr lvl="1"/>
-            <a:r>
-              <a:rPr lang="en-US" dirty="0"/>
-              <a:t>Some gibberish used by </a:t>
-            </a:r>
-            <a:r>
-              <a:rPr lang="en-US" i="1" dirty="0" err="1"/>
-              <a:t>conda</a:t>
-            </a:r>
-            <a:r>
-              <a:rPr lang="en-US" dirty="0"/>
-              <a:t> </a:t>
-            </a:r>
-          </a:p>
-          <a:p>
-            <a:pPr marL="0" indent="0">
-              <a:buNone/>
-            </a:pPr>
-            <a:r>
-              <a:rPr lang="mr-IN" dirty="0"/>
-              <a:t>…</a:t>
-            </a:r>
-            <a:r>
-              <a:rPr lang="en-US" dirty="0"/>
-              <a:t> if there’s even anything there yet </a:t>
-            </a:r>
-          </a:p>
-          <a:p>
-            <a:pPr marL="0" indent="0">
-              <a:buNone/>
-            </a:pPr>
-            <a:endParaRPr lang="en-US" dirty="0"/>
-          </a:p>
-          <a:p>
-            <a:pPr marL="0" indent="0">
-              <a:buNone/>
-            </a:pPr>
-            <a:r>
-              <a:rPr lang="en-US" dirty="0"/>
-              <a:t>Modifications require running </a:t>
-            </a:r>
-            <a:r>
-              <a:rPr lang="en-US" i="1" dirty="0"/>
-              <a:t>source ~/.</a:t>
-            </a:r>
-            <a:r>
-              <a:rPr lang="en-US" i="1" dirty="0" err="1"/>
-              <a:t>bash_profile</a:t>
-            </a:r>
-            <a:r>
-              <a:rPr lang="en-US" dirty="0"/>
-              <a:t> or simply restarting the terminal to take effect </a:t>
-            </a:r>
           </a:p>
         </p:txBody>
       </p:sp>
     </p:spTree>
     <p:extLst>
       <p:ext uri="{BB962C8B-B14F-4D97-AF65-F5344CB8AC3E}">
-        <p14:creationId xmlns:p14="http://schemas.microsoft.com/office/powerpoint/2010/main" val="1714711338"/>
+        <p14:creationId xmlns:p14="http://schemas.microsoft.com/office/powerpoint/2010/main" val="691502808"/>
       </p:ext>
     </p:extLst>
   </p:cSld>
@@ -9884,7 +10012,7 @@
           <a:p>
             <a:r>
               <a:rPr lang="en-US" dirty="0"/>
-              <a:t>The Bash Profile: Windows Equivalent </a:t>
+              <a:t>The Bash Profile </a:t>
             </a:r>
           </a:p>
         </p:txBody>
@@ -9901,197 +10029,137 @@
         </p:nvSpPr>
         <p:spPr>
           <a:xfrm>
-            <a:off x="491320" y="2350520"/>
-            <a:ext cx="10658901" cy="4295939"/>
-          </a:xfrm>
-        </p:spPr>
-        <p:txBody>
-          <a:bodyPr/>
+            <a:off x="680321" y="2336872"/>
+            <a:ext cx="9613861" cy="4521128"/>
+          </a:xfrm>
+        </p:spPr>
+        <p:txBody>
+          <a:bodyPr>
+            <a:normAutofit/>
+          </a:bodyPr>
           <a:lstStyle/>
           <a:p>
-            <a:pPr marL="0" marR="0" lvl="0" indent="0" defTabSz="914400" eaLnBrk="1" fontAlgn="auto" latinLnBrk="0" hangingPunct="1">
-              <a:lnSpc>
-                <a:spcPct val="100000"/>
-              </a:lnSpc>
-              <a:spcBef>
-                <a:spcPts val="0"/>
-              </a:spcBef>
-              <a:spcAft>
-                <a:spcPts val="0"/>
-              </a:spcAft>
-              <a:buClrTx/>
-              <a:buSzTx/>
-              <a:buFontTx/>
-              <a:buNone/>
-              <a:tabLst/>
-              <a:defRPr/>
-            </a:pPr>
-            <a:r>
-              <a:rPr lang="en-US" dirty="0"/>
-              <a:t>No standard name, but files can be set to </a:t>
+            <a:pPr marL="0" indent="0">
+              <a:buNone/>
+            </a:pPr>
+            <a:r>
+              <a:rPr lang="en-US" dirty="0"/>
+              <a:t>A particular file located at ~/.</a:t>
+            </a:r>
+            <a:r>
+              <a:rPr lang="en-US" dirty="0" err="1"/>
+              <a:t>bash_profile</a:t>
+            </a:r>
+            <a:r>
+              <a:rPr lang="en-US" dirty="0"/>
+              <a:t> (can also use ~/.</a:t>
+            </a:r>
+            <a:r>
+              <a:rPr lang="en-US" dirty="0" err="1"/>
+              <a:t>bashrc</a:t>
+            </a:r>
+            <a:r>
+              <a:rPr lang="en-US" dirty="0"/>
+              <a:t>) </a:t>
+            </a:r>
+          </a:p>
+          <a:p>
+            <a:pPr marL="0" indent="0">
+              <a:buNone/>
+            </a:pPr>
+            <a:endParaRPr lang="en-US" dirty="0"/>
+          </a:p>
+          <a:p>
+            <a:pPr marL="0" indent="0">
+              <a:buNone/>
+            </a:pPr>
+            <a:r>
+              <a:rPr lang="en-US" dirty="0"/>
+              <a:t>Typically contains</a:t>
+            </a:r>
+            <a:r>
+              <a:rPr lang="mr-IN" dirty="0"/>
+              <a:t>…</a:t>
+            </a:r>
+            <a:r>
+              <a:rPr lang="en-US" dirty="0"/>
+              <a:t> </a:t>
+            </a:r>
+          </a:p>
+          <a:p>
+            <a:pPr lvl="1"/>
+            <a:r>
+              <a:rPr lang="en-US" dirty="0"/>
+              <a:t>Environment variables </a:t>
+            </a:r>
+          </a:p>
+          <a:p>
+            <a:pPr lvl="1"/>
+            <a:r>
+              <a:rPr lang="en-US" dirty="0"/>
+              <a:t>Aliases </a:t>
+            </a:r>
+          </a:p>
+          <a:p>
+            <a:pPr lvl="1"/>
+            <a:r>
+              <a:rPr lang="en-US" dirty="0"/>
+              <a:t>Modifications to your PATH or PYTHONPATH </a:t>
+            </a:r>
+          </a:p>
+          <a:p>
+            <a:pPr lvl="1"/>
+            <a:r>
+              <a:rPr lang="en-US" dirty="0"/>
+              <a:t>Some gibberish used by </a:t>
             </a:r>
             <a:r>
               <a:rPr lang="en-US" i="1" dirty="0" err="1"/>
-              <a:t>autorun</a:t>
-            </a:r>
-            <a:r>
-              <a:rPr lang="en-US" dirty="0"/>
-              <a:t> upon terminal start, achieving the same effect </a:t>
-            </a:r>
-          </a:p>
-          <a:p>
-            <a:pPr marL="0" marR="0" lvl="0" indent="0" defTabSz="914400" eaLnBrk="1" fontAlgn="auto" latinLnBrk="0" hangingPunct="1">
-              <a:lnSpc>
-                <a:spcPct val="100000"/>
-              </a:lnSpc>
-              <a:spcBef>
-                <a:spcPts val="0"/>
-              </a:spcBef>
-              <a:spcAft>
-                <a:spcPts val="0"/>
-              </a:spcAft>
-              <a:buClrTx/>
-              <a:buSzTx/>
-              <a:buFontTx/>
-              <a:buNone/>
-              <a:tabLst/>
-              <a:defRPr/>
+              <a:t>conda</a:t>
+            </a:r>
+            <a:r>
+              <a:rPr lang="en-US" dirty="0"/>
+              <a:t> </a:t>
+            </a:r>
+          </a:p>
+          <a:p>
+            <a:pPr marL="0" indent="0">
+              <a:buNone/>
+            </a:pPr>
+            <a:r>
+              <a:rPr lang="mr-IN" dirty="0"/>
+              <a:t>…</a:t>
+            </a:r>
+            <a:r>
+              <a:rPr lang="en-US" dirty="0"/>
+              <a:t> if there’s even anything there yet </a:t>
+            </a:r>
+          </a:p>
+          <a:p>
+            <a:pPr marL="0" indent="0">
+              <a:buNone/>
             </a:pPr>
             <a:endParaRPr lang="en-US" dirty="0"/>
           </a:p>
           <a:p>
-            <a:pPr marL="0" lvl="0" indent="0">
-              <a:lnSpc>
-                <a:spcPct val="100000"/>
-              </a:lnSpc>
-              <a:spcBef>
-                <a:spcPts val="0"/>
-              </a:spcBef>
-              <a:buNone/>
-            </a:pPr>
-            <a:r>
-              <a:rPr lang="en-US" dirty="0" err="1"/>
-              <a:t>cmd.exe</a:t>
-            </a:r>
-            <a:r>
-              <a:rPr lang="en-US" dirty="0"/>
-              <a:t> /k "%HOMEDRIVE%\%HOMEPATH%\</a:t>
-            </a:r>
-            <a:r>
-              <a:rPr lang="en-US" dirty="0" err="1"/>
-              <a:t>cmd-startup.bat</a:t>
-            </a:r>
-            <a:r>
-              <a:rPr lang="en-US" dirty="0"/>
-              <a:t>” </a:t>
-            </a:r>
-          </a:p>
-          <a:p>
-            <a:pPr lvl="1">
-              <a:lnSpc>
-                <a:spcPct val="100000"/>
-              </a:lnSpc>
-              <a:spcBef>
-                <a:spcPts val="0"/>
-              </a:spcBef>
-            </a:pPr>
+            <a:pPr marL="0" indent="0">
+              <a:buNone/>
+            </a:pPr>
+            <a:r>
+              <a:rPr lang="en-US" dirty="0"/>
+              <a:t>Modifications require running </a:t>
+            </a:r>
             <a:r>
               <a:rPr lang="en-US" i="1" dirty="0"/>
-              <a:t>/k</a:t>
-            </a:r>
-            <a:r>
-              <a:rPr lang="en-US" dirty="0"/>
-              <a:t> causes the </a:t>
-            </a:r>
-            <a:r>
-              <a:rPr lang="en-US" dirty="0" err="1"/>
-              <a:t>cmd-startup.bat</a:t>
-            </a:r>
-            <a:r>
-              <a:rPr lang="en-US" dirty="0"/>
-              <a:t> file to run on launching command line </a:t>
-            </a:r>
-            <a:endParaRPr lang="en-US" i="1" dirty="0"/>
-          </a:p>
-          <a:p>
-            <a:pPr marL="0" marR="0" lvl="0" indent="0" defTabSz="914400" eaLnBrk="1" fontAlgn="auto" latinLnBrk="0" hangingPunct="1">
-              <a:lnSpc>
-                <a:spcPct val="100000"/>
-              </a:lnSpc>
-              <a:spcBef>
-                <a:spcPts val="0"/>
-              </a:spcBef>
-              <a:spcAft>
-                <a:spcPts val="0"/>
-              </a:spcAft>
-              <a:buClrTx/>
-              <a:buSzTx/>
-              <a:buFontTx/>
-              <a:buNone/>
-              <a:tabLst/>
-              <a:defRPr/>
-            </a:pPr>
-            <a:endParaRPr lang="en-US" dirty="0"/>
-          </a:p>
-          <a:p>
-            <a:pPr marL="0" lvl="0" indent="0">
-              <a:lnSpc>
-                <a:spcPct val="100000"/>
-              </a:lnSpc>
-              <a:spcBef>
-                <a:spcPts val="0"/>
-              </a:spcBef>
-              <a:buNone/>
-            </a:pPr>
-            <a:r>
-              <a:rPr lang="en-US" dirty="0">
-                <a:hlinkClick r:id="rId2"/>
-              </a:rPr>
-              <a:t>https://superuser.com/questions/144347/is-there-windows-equivalent-to-the-bashrc-file-in-linux</a:t>
-            </a:r>
-            <a:endParaRPr lang="en-US" dirty="0"/>
-          </a:p>
-          <a:p>
-            <a:pPr marL="0" lvl="0" indent="0">
-              <a:lnSpc>
-                <a:spcPct val="100000"/>
-              </a:lnSpc>
-              <a:spcBef>
-                <a:spcPts val="0"/>
-              </a:spcBef>
-              <a:buNone/>
-            </a:pPr>
-            <a:endParaRPr lang="en-US" dirty="0"/>
-          </a:p>
-          <a:p>
-            <a:pPr marL="0" lvl="0" indent="0">
-              <a:lnSpc>
-                <a:spcPct val="100000"/>
-              </a:lnSpc>
-              <a:spcBef>
-                <a:spcPts val="0"/>
-              </a:spcBef>
-              <a:buNone/>
-            </a:pPr>
-            <a:r>
-              <a:rPr lang="en-US" dirty="0"/>
-              <a:t>Disclaimer: If you’re an astronomer, bash </a:t>
-            </a:r>
-            <a:r>
-              <a:rPr lang="en-US" i="1" dirty="0"/>
-              <a:t>is</a:t>
-            </a:r>
-            <a:r>
-              <a:rPr lang="en-US" dirty="0"/>
-              <a:t> a </a:t>
-            </a:r>
-            <a:r>
-              <a:rPr lang="en-US" i="1" dirty="0"/>
-              <a:t>better choice </a:t>
-            </a:r>
-            <a:r>
-              <a:rPr lang="en-US" dirty="0"/>
-              <a:t>than PowerShell. This will vary in other fields, but astronomy uses Unix-based operating systems. </a:t>
+              <a:t>source ~/.</a:t>
+            </a:r>
+            <a:r>
+              <a:rPr lang="en-US" i="1" dirty="0" err="1"/>
+              <a:t>bash_profile</a:t>
+            </a:r>
+            <a:r>
+              <a:rPr lang="en-US" dirty="0"/>
+              <a:t> or simply restarting the terminal to take effect </a:t>
             </a:r>
           </a:p>
         </p:txBody>
@@ -10099,7 +10167,7 @@
     </p:spTree>
     <p:extLst>
       <p:ext uri="{BB962C8B-B14F-4D97-AF65-F5344CB8AC3E}">
-        <p14:creationId xmlns:p14="http://schemas.microsoft.com/office/powerpoint/2010/main" val="187203637"/>
+        <p14:creationId xmlns:p14="http://schemas.microsoft.com/office/powerpoint/2010/main" val="1714711338"/>
       </p:ext>
     </p:extLst>
   </p:cSld>
@@ -10143,7 +10211,7 @@
           <a:p>
             <a:r>
               <a:rPr lang="en-US" dirty="0"/>
-              <a:t>Aliases </a:t>
+              <a:t>The Bash Profile: Windows Equivalent </a:t>
             </a:r>
           </a:p>
         </p:txBody>
@@ -10160,121 +10228,197 @@
         </p:nvSpPr>
         <p:spPr>
           <a:xfrm>
-            <a:off x="680321" y="2336872"/>
-            <a:ext cx="9613861" cy="4227701"/>
+            <a:off x="491320" y="2350520"/>
+            <a:ext cx="10658901" cy="4295939"/>
           </a:xfrm>
         </p:spPr>
         <p:txBody>
           <a:bodyPr/>
           <a:lstStyle/>
           <a:p>
-            <a:pPr marL="0" indent="0">
-              <a:buNone/>
-            </a:pPr>
-            <a:r>
-              <a:rPr lang="en-US" dirty="0"/>
-              <a:t>A way of creating a terminal command out of other terminal commands </a:t>
-            </a:r>
-          </a:p>
-          <a:p>
-            <a:pPr marL="0" indent="0">
-              <a:buNone/>
+            <a:pPr marL="0" marR="0" lvl="0" indent="0" defTabSz="914400" eaLnBrk="1" fontAlgn="auto" latinLnBrk="0" hangingPunct="1">
+              <a:lnSpc>
+                <a:spcPct val="100000"/>
+              </a:lnSpc>
+              <a:spcBef>
+                <a:spcPts val="0"/>
+              </a:spcBef>
+              <a:spcAft>
+                <a:spcPts val="0"/>
+              </a:spcAft>
+              <a:buClrTx/>
+              <a:buSzTx/>
+              <a:buFontTx/>
+              <a:buNone/>
+              <a:tabLst/>
+              <a:defRPr/>
+            </a:pPr>
+            <a:r>
+              <a:rPr lang="en-US" dirty="0"/>
+              <a:t>No standard name, but files can be set to </a:t>
+            </a:r>
+            <a:r>
+              <a:rPr lang="en-US" i="1" dirty="0" err="1"/>
+              <a:t>autorun</a:t>
+            </a:r>
+            <a:r>
+              <a:rPr lang="en-US" dirty="0"/>
+              <a:t> upon terminal start, achieving the same effect </a:t>
+            </a:r>
+          </a:p>
+          <a:p>
+            <a:pPr marL="0" marR="0" lvl="0" indent="0" defTabSz="914400" eaLnBrk="1" fontAlgn="auto" latinLnBrk="0" hangingPunct="1">
+              <a:lnSpc>
+                <a:spcPct val="100000"/>
+              </a:lnSpc>
+              <a:spcBef>
+                <a:spcPts val="0"/>
+              </a:spcBef>
+              <a:spcAft>
+                <a:spcPts val="0"/>
+              </a:spcAft>
+              <a:buClrTx/>
+              <a:buSzTx/>
+              <a:buFontTx/>
+              <a:buNone/>
+              <a:tabLst/>
+              <a:defRPr/>
             </a:pPr>
             <a:endParaRPr lang="en-US" dirty="0"/>
           </a:p>
           <a:p>
-            <a:pPr marL="0" indent="0">
-              <a:buNone/>
-            </a:pPr>
-            <a:r>
-              <a:rPr lang="en-US" dirty="0"/>
-              <a:t>Can create one in your terminal independent of your bash profile, but putting them there makes them permanent </a:t>
-            </a:r>
-          </a:p>
-          <a:p>
-            <a:pPr marL="0" indent="0">
-              <a:buNone/>
+            <a:pPr marL="0" lvl="0" indent="0">
+              <a:lnSpc>
+                <a:spcPct val="100000"/>
+              </a:lnSpc>
+              <a:spcBef>
+                <a:spcPts val="0"/>
+              </a:spcBef>
+              <a:buNone/>
+            </a:pPr>
+            <a:r>
+              <a:rPr lang="en-US" dirty="0" err="1"/>
+              <a:t>cmd.exe</a:t>
+            </a:r>
+            <a:r>
+              <a:rPr lang="en-US" dirty="0"/>
+              <a:t> /k "%HOMEDRIVE%\%HOMEPATH%\</a:t>
+            </a:r>
+            <a:r>
+              <a:rPr lang="en-US" dirty="0" err="1"/>
+              <a:t>cmd-startup.bat</a:t>
+            </a:r>
+            <a:r>
+              <a:rPr lang="en-US" dirty="0"/>
+              <a:t>” </a:t>
+            </a:r>
+          </a:p>
+          <a:p>
+            <a:pPr lvl="1">
+              <a:lnSpc>
+                <a:spcPct val="100000"/>
+              </a:lnSpc>
+              <a:spcBef>
+                <a:spcPts val="0"/>
+              </a:spcBef>
+            </a:pPr>
+            <a:r>
+              <a:rPr lang="en-US" i="1" dirty="0"/>
+              <a:t>/k</a:t>
+            </a:r>
+            <a:r>
+              <a:rPr lang="en-US" dirty="0"/>
+              <a:t> causes the </a:t>
+            </a:r>
+            <a:r>
+              <a:rPr lang="en-US" dirty="0" err="1"/>
+              <a:t>cmd-startup.bat</a:t>
+            </a:r>
+            <a:r>
+              <a:rPr lang="en-US" dirty="0"/>
+              <a:t> file to run on launching command line </a:t>
+            </a:r>
+            <a:endParaRPr lang="en-US" i="1" dirty="0"/>
+          </a:p>
+          <a:p>
+            <a:pPr marL="0" marR="0" lvl="0" indent="0" defTabSz="914400" eaLnBrk="1" fontAlgn="auto" latinLnBrk="0" hangingPunct="1">
+              <a:lnSpc>
+                <a:spcPct val="100000"/>
+              </a:lnSpc>
+              <a:spcBef>
+                <a:spcPts val="0"/>
+              </a:spcBef>
+              <a:spcAft>
+                <a:spcPts val="0"/>
+              </a:spcAft>
+              <a:buClrTx/>
+              <a:buSzTx/>
+              <a:buFontTx/>
+              <a:buNone/>
+              <a:tabLst/>
+              <a:defRPr/>
             </a:pPr>
             <a:endParaRPr lang="en-US" dirty="0"/>
           </a:p>
           <a:p>
-            <a:pPr marL="0" indent="0">
-              <a:buNone/>
-            </a:pPr>
-            <a:r>
-              <a:rPr lang="en-US" dirty="0"/>
-              <a:t>Example: </a:t>
-            </a:r>
-          </a:p>
-          <a:p>
-            <a:pPr marL="0" indent="0">
-              <a:buNone/>
-            </a:pPr>
-            <a:r>
-              <a:rPr lang="en-US" dirty="0"/>
-              <a:t>	alias </a:t>
-            </a:r>
-            <a:r>
-              <a:rPr lang="en-US" dirty="0" err="1"/>
-              <a:t>makeplot</a:t>
-            </a:r>
-            <a:r>
-              <a:rPr lang="en-US" dirty="0"/>
-              <a:t>=“python </a:t>
-            </a:r>
-            <a:r>
-              <a:rPr lang="en-US" dirty="0" err="1"/>
-              <a:t>plotting_script.py</a:t>
-            </a:r>
-            <a:r>
-              <a:rPr lang="en-US" dirty="0"/>
-              <a:t>” </a:t>
-            </a:r>
-          </a:p>
-          <a:p>
-            <a:pPr marL="0" indent="0">
-              <a:buNone/>
-            </a:pPr>
-            <a:r>
-              <a:rPr lang="en-US" dirty="0"/>
-              <a:t>	alias </a:t>
-            </a:r>
-            <a:r>
-              <a:rPr lang="en-US" dirty="0" err="1"/>
-              <a:t>lc</a:t>
-            </a:r>
-            <a:r>
-              <a:rPr lang="en-US" dirty="0"/>
-              <a:t>=“ls </a:t>
-            </a:r>
-            <a:r>
-              <a:rPr lang="mr-IN" dirty="0"/>
-              <a:t>–</a:t>
-            </a:r>
-            <a:r>
-              <a:rPr lang="en-US" dirty="0" err="1"/>
-              <a:t>lha</a:t>
-            </a:r>
-            <a:r>
-              <a:rPr lang="en-US" dirty="0"/>
-              <a:t>” </a:t>
-            </a:r>
-          </a:p>
-          <a:p>
-            <a:pPr marL="0" indent="0">
-              <a:buNone/>
-            </a:pPr>
-            <a:r>
-              <a:rPr lang="en-US" dirty="0"/>
-              <a:t>	alias </a:t>
-            </a:r>
-            <a:r>
-              <a:rPr lang="en-US" dirty="0" err="1"/>
-              <a:t>surp</a:t>
-            </a:r>
-            <a:r>
-              <a:rPr lang="en-US" dirty="0"/>
-              <a:t>=“cd ~/Desktop/SURP/”</a:t>
+            <a:pPr marL="0" lvl="0" indent="0">
+              <a:lnSpc>
+                <a:spcPct val="100000"/>
+              </a:lnSpc>
+              <a:spcBef>
+                <a:spcPts val="0"/>
+              </a:spcBef>
+              <a:buNone/>
+            </a:pPr>
+            <a:r>
+              <a:rPr lang="en-US" dirty="0">
+                <a:hlinkClick r:id="rId2"/>
+              </a:rPr>
+              <a:t>https://superuser.com/questions/144347/is-there-windows-equivalent-to-the-bashrc-file-in-linux</a:t>
+            </a:r>
+            <a:endParaRPr lang="en-US" dirty="0"/>
+          </a:p>
+          <a:p>
+            <a:pPr marL="0" lvl="0" indent="0">
+              <a:lnSpc>
+                <a:spcPct val="100000"/>
+              </a:lnSpc>
+              <a:spcBef>
+                <a:spcPts val="0"/>
+              </a:spcBef>
+              <a:buNone/>
+            </a:pPr>
+            <a:endParaRPr lang="en-US" dirty="0"/>
+          </a:p>
+          <a:p>
+            <a:pPr marL="0" lvl="0" indent="0">
+              <a:lnSpc>
+                <a:spcPct val="100000"/>
+              </a:lnSpc>
+              <a:spcBef>
+                <a:spcPts val="0"/>
+              </a:spcBef>
+              <a:buNone/>
+            </a:pPr>
+            <a:r>
+              <a:rPr lang="en-US" dirty="0"/>
+              <a:t>Disclaimer: If you’re an astronomer, bash </a:t>
+            </a:r>
+            <a:r>
+              <a:rPr lang="en-US" i="1" dirty="0"/>
+              <a:t>is</a:t>
+            </a:r>
+            <a:r>
+              <a:rPr lang="en-US" dirty="0"/>
+              <a:t> a </a:t>
+            </a:r>
+            <a:r>
+              <a:rPr lang="en-US" i="1" dirty="0"/>
+              <a:t>better choice </a:t>
+            </a:r>
+            <a:r>
+              <a:rPr lang="en-US" dirty="0"/>
+              <a:t>than PowerShell. This will vary in other fields, but astronomy uses Unix-based operating systems. </a:t>
             </a:r>
           </a:p>
         </p:txBody>
@@ -10282,7 +10426,7 @@
     </p:spTree>
     <p:extLst>
       <p:ext uri="{BB962C8B-B14F-4D97-AF65-F5344CB8AC3E}">
-        <p14:creationId xmlns:p14="http://schemas.microsoft.com/office/powerpoint/2010/main" val="1613828523"/>
+        <p14:creationId xmlns:p14="http://schemas.microsoft.com/office/powerpoint/2010/main" val="187203637"/>
       </p:ext>
     </p:extLst>
   </p:cSld>
@@ -10326,6 +10470,189 @@
           <a:p>
             <a:r>
               <a:rPr lang="en-US" dirty="0"/>
+              <a:t>Aliases </a:t>
+            </a:r>
+          </a:p>
+        </p:txBody>
+      </p:sp>
+      <p:sp>
+        <p:nvSpPr>
+          <p:cNvPr id="3" name="Content Placeholder 2"/>
+          <p:cNvSpPr>
+            <a:spLocks noGrp="1"/>
+          </p:cNvSpPr>
+          <p:nvPr>
+            <p:ph idx="1"/>
+          </p:nvPr>
+        </p:nvSpPr>
+        <p:spPr>
+          <a:xfrm>
+            <a:off x="680321" y="2336872"/>
+            <a:ext cx="9613861" cy="4227701"/>
+          </a:xfrm>
+        </p:spPr>
+        <p:txBody>
+          <a:bodyPr/>
+          <a:lstStyle/>
+          <a:p>
+            <a:pPr marL="0" indent="0">
+              <a:buNone/>
+            </a:pPr>
+            <a:r>
+              <a:rPr lang="en-US" dirty="0"/>
+              <a:t>A way of creating a terminal command out of other terminal commands </a:t>
+            </a:r>
+          </a:p>
+          <a:p>
+            <a:pPr marL="0" indent="0">
+              <a:buNone/>
+            </a:pPr>
+            <a:endParaRPr lang="en-US" dirty="0"/>
+          </a:p>
+          <a:p>
+            <a:pPr marL="0" indent="0">
+              <a:buNone/>
+            </a:pPr>
+            <a:r>
+              <a:rPr lang="en-US" dirty="0"/>
+              <a:t>Can create one in your terminal independent of your bash profile, but putting them there makes them permanent </a:t>
+            </a:r>
+          </a:p>
+          <a:p>
+            <a:pPr marL="0" indent="0">
+              <a:buNone/>
+            </a:pPr>
+            <a:endParaRPr lang="en-US" dirty="0"/>
+          </a:p>
+          <a:p>
+            <a:pPr marL="0" indent="0">
+              <a:buNone/>
+            </a:pPr>
+            <a:r>
+              <a:rPr lang="en-US" dirty="0"/>
+              <a:t>Example: </a:t>
+            </a:r>
+          </a:p>
+          <a:p>
+            <a:pPr marL="0" indent="0">
+              <a:buNone/>
+            </a:pPr>
+            <a:r>
+              <a:rPr lang="en-US" dirty="0"/>
+              <a:t>	alias </a:t>
+            </a:r>
+            <a:r>
+              <a:rPr lang="en-US" dirty="0" err="1"/>
+              <a:t>makeplot</a:t>
+            </a:r>
+            <a:r>
+              <a:rPr lang="en-US" dirty="0"/>
+              <a:t>=“python </a:t>
+            </a:r>
+            <a:r>
+              <a:rPr lang="en-US" dirty="0" err="1"/>
+              <a:t>plotting_script.py</a:t>
+            </a:r>
+            <a:r>
+              <a:rPr lang="en-US" dirty="0"/>
+              <a:t>” </a:t>
+            </a:r>
+          </a:p>
+          <a:p>
+            <a:pPr marL="0" indent="0">
+              <a:buNone/>
+            </a:pPr>
+            <a:r>
+              <a:rPr lang="en-US" dirty="0"/>
+              <a:t>	alias </a:t>
+            </a:r>
+            <a:r>
+              <a:rPr lang="en-US" dirty="0" err="1"/>
+              <a:t>lc</a:t>
+            </a:r>
+            <a:r>
+              <a:rPr lang="en-US" dirty="0"/>
+              <a:t>=“ls </a:t>
+            </a:r>
+            <a:r>
+              <a:rPr lang="mr-IN" dirty="0"/>
+              <a:t>–</a:t>
+            </a:r>
+            <a:r>
+              <a:rPr lang="en-US" dirty="0" err="1"/>
+              <a:t>lha</a:t>
+            </a:r>
+            <a:r>
+              <a:rPr lang="en-US" dirty="0"/>
+              <a:t>” </a:t>
+            </a:r>
+          </a:p>
+          <a:p>
+            <a:pPr marL="0" indent="0">
+              <a:buNone/>
+            </a:pPr>
+            <a:r>
+              <a:rPr lang="en-US" dirty="0"/>
+              <a:t>	alias </a:t>
+            </a:r>
+            <a:r>
+              <a:rPr lang="en-US" dirty="0" err="1"/>
+              <a:t>surp</a:t>
+            </a:r>
+            <a:r>
+              <a:rPr lang="en-US" dirty="0"/>
+              <a:t>=“cd ~/Desktop/SURP/”</a:t>
+            </a:r>
+          </a:p>
+        </p:txBody>
+      </p:sp>
+    </p:spTree>
+    <p:extLst>
+      <p:ext uri="{BB962C8B-B14F-4D97-AF65-F5344CB8AC3E}">
+        <p14:creationId xmlns:p14="http://schemas.microsoft.com/office/powerpoint/2010/main" val="1613828523"/>
+      </p:ext>
+    </p:extLst>
+  </p:cSld>
+  <p:clrMapOvr>
+    <a:masterClrMapping/>
+  </p:clrMapOvr>
+</p:sld>
+</file>
+
+<file path=ppt/slides/slide18.xml><?xml version="1.0" encoding="utf-8"?>
+<p:sld xmlns:a="http://schemas.openxmlformats.org/drawingml/2006/main" xmlns:r="http://schemas.openxmlformats.org/officeDocument/2006/relationships" xmlns:p="http://schemas.openxmlformats.org/presentationml/2006/main">
+  <p:cSld>
+    <p:spTree>
+      <p:nvGrpSpPr>
+        <p:cNvPr id="1" name=""/>
+        <p:cNvGrpSpPr/>
+        <p:nvPr/>
+      </p:nvGrpSpPr>
+      <p:grpSpPr>
+        <a:xfrm>
+          <a:off x="0" y="0"/>
+          <a:ext cx="0" cy="0"/>
+          <a:chOff x="0" y="0"/>
+          <a:chExt cx="0" cy="0"/>
+        </a:xfrm>
+      </p:grpSpPr>
+      <p:sp>
+        <p:nvSpPr>
+          <p:cNvPr id="2" name="Title 1"/>
+          <p:cNvSpPr>
+            <a:spLocks noGrp="1"/>
+          </p:cNvSpPr>
+          <p:nvPr>
+            <p:ph type="title"/>
+          </p:nvPr>
+        </p:nvSpPr>
+        <p:spPr/>
+        <p:txBody>
+          <a:bodyPr/>
+          <a:lstStyle/>
+          <a:p>
+            <a:r>
+              <a:rPr lang="en-US" dirty="0"/>
               <a:t>Environment Variables </a:t>
             </a:r>
           </a:p>
@@ -10444,7 +10771,7 @@
 </p:sld>
 </file>
 
-<file path=ppt/slides/slide18.xml><?xml version="1.0" encoding="utf-8"?>
+<file path=ppt/slides/slide19.xml><?xml version="1.0" encoding="utf-8"?>
 <p:sld xmlns:a="http://schemas.openxmlformats.org/drawingml/2006/main" xmlns:r="http://schemas.openxmlformats.org/officeDocument/2006/relationships" xmlns:p="http://schemas.openxmlformats.org/presentationml/2006/main">
   <p:cSld>
     <p:spTree>
@@ -11094,7 +11421,13 @@
       </p:grpSpPr>
       <p:sp>
         <p:nvSpPr>
-          <p:cNvPr id="2" name="Title 1"/>
+          <p:cNvPr id="2" name="Title 1">
+            <a:extLst>
+              <a:ext uri="{FF2B5EF4-FFF2-40B4-BE49-F238E27FC236}">
+                <a16:creationId xmlns:a16="http://schemas.microsoft.com/office/drawing/2014/main" id="{4E69A367-C110-5C45-9FDF-B1D56D0263F5}"/>
+              </a:ext>
+            </a:extLst>
+          </p:cNvPr>
           <p:cNvSpPr>
             <a:spLocks noGrp="1"/>
           </p:cNvSpPr>
@@ -11108,28 +11441,21 @@
           <a:lstStyle/>
           <a:p>
             <a:r>
-              <a:rPr lang="en-US" i="1" dirty="0" err="1"/>
-              <a:t>pwd</a:t>
-            </a:r>
-            <a:r>
-              <a:rPr lang="en-US" dirty="0"/>
-              <a:t>: Print Working Directory [</a:t>
-            </a:r>
-            <a:r>
-              <a:rPr lang="en-US" i="1" dirty="0" err="1"/>
-              <a:t>chdir</a:t>
-            </a:r>
-            <a:r>
-              <a:rPr lang="en-US" dirty="0"/>
-              <a:t>]  </a:t>
-            </a:r>
-            <a:endParaRPr lang="en-US" i="1" dirty="0"/>
-          </a:p>
-        </p:txBody>
-      </p:sp>
-      <p:sp>
-        <p:nvSpPr>
-          <p:cNvPr id="3" name="Content Placeholder 2"/>
+              <a:rPr lang="en-US" dirty="0"/>
+              <a:t>echo: Print Statements</a:t>
+            </a:r>
+          </a:p>
+        </p:txBody>
+      </p:sp>
+      <p:sp>
+        <p:nvSpPr>
+          <p:cNvPr id="3" name="Content Placeholder 2">
+            <a:extLst>
+              <a:ext uri="{FF2B5EF4-FFF2-40B4-BE49-F238E27FC236}">
+                <a16:creationId xmlns:a16="http://schemas.microsoft.com/office/drawing/2014/main" id="{8F971D8F-62A8-2E41-B26C-0888A60946FA}"/>
+              </a:ext>
+            </a:extLst>
+          </p:cNvPr>
           <p:cNvSpPr>
             <a:spLocks noGrp="1"/>
           </p:cNvSpPr>
@@ -11139,12 +11465,14 @@
         </p:nvSpPr>
         <p:spPr>
           <a:xfrm>
-            <a:off x="680321" y="2336872"/>
-            <a:ext cx="9613861" cy="4306815"/>
-          </a:xfrm>
-        </p:spPr>
-        <p:txBody>
-          <a:bodyPr/>
+            <a:off x="680321" y="2336873"/>
+            <a:ext cx="9613861" cy="4092502"/>
+          </a:xfrm>
+        </p:spPr>
+        <p:txBody>
+          <a:bodyPr>
+            <a:normAutofit/>
+          </a:bodyPr>
           <a:lstStyle/>
           <a:p>
             <a:pPr marL="0" indent="0">
@@ -11152,14 +11480,17 @@
             </a:pPr>
             <a:r>
               <a:rPr lang="en-US" dirty="0"/>
-              <a:t>Prints the name of the directory you’re currently in </a:t>
+              <a:t>Prints a message to the console</a:t>
             </a:r>
           </a:p>
           <a:p>
             <a:pPr marL="0" indent="0">
               <a:buNone/>
             </a:pPr>
-            <a:endParaRPr lang="en-US" dirty="0"/>
+            <a:r>
+              <a:rPr lang="en-US" dirty="0"/>
+              <a:t>Example: </a:t>
+            </a:r>
           </a:p>
           <a:p>
             <a:pPr marL="0" indent="0">
@@ -11167,7 +11498,7 @@
             </a:pPr>
             <a:r>
               <a:rPr lang="en-US" dirty="0"/>
-              <a:t>Example: </a:t>
+              <a:t>	$ echo Hello world! </a:t>
             </a:r>
           </a:p>
           <a:p>
@@ -11176,15 +11507,7 @@
             </a:pPr>
             <a:r>
               <a:rPr lang="en-US" dirty="0"/>
-              <a:t>	$ </a:t>
-            </a:r>
-            <a:r>
-              <a:rPr lang="en-US" dirty="0" err="1"/>
-              <a:t>pwd</a:t>
-            </a:r>
-            <a:r>
-              <a:rPr lang="en-US" dirty="0"/>
-              <a:t> </a:t>
+              <a:t>	Hello world!  </a:t>
             </a:r>
           </a:p>
           <a:p>
@@ -11193,30 +11516,17 @@
             </a:pPr>
             <a:r>
               <a:rPr lang="en-US" dirty="0"/>
-              <a:t>	/Users/</a:t>
-            </a:r>
-            <a:r>
-              <a:rPr lang="en-US" dirty="0" err="1"/>
-              <a:t>BrutusBuckeye</a:t>
-            </a:r>
-            <a:r>
-              <a:rPr lang="en-US" dirty="0"/>
-              <a:t>/Desktop/SURP/</a:t>
-            </a:r>
-            <a:r>
-              <a:rPr lang="en-US" dirty="0" err="1"/>
-              <a:t>bootcamp</a:t>
-            </a:r>
-            <a:r>
-              <a:rPr lang="en-US" dirty="0"/>
-              <a:t>/</a:t>
+              <a:t>	$ echo $x</a:t>
             </a:r>
           </a:p>
           <a:p>
             <a:pPr marL="0" indent="0">
               <a:buNone/>
             </a:pPr>
-            <a:endParaRPr lang="en-US" dirty="0"/>
+            <a:r>
+              <a:rPr lang="en-US" dirty="0"/>
+              <a:t>	</a:t>
+            </a:r>
           </a:p>
           <a:p>
             <a:pPr marL="0" indent="0">
@@ -11224,23 +11534,25 @@
             </a:pPr>
             <a:r>
               <a:rPr lang="en-US" dirty="0"/>
-              <a:t> Note: Windows users should be careful not to confuse this with Python’s </a:t>
-            </a:r>
-            <a:r>
-              <a:rPr lang="en-US" i="1" dirty="0" err="1"/>
-              <a:t>os.chdir</a:t>
-            </a:r>
-            <a:r>
-              <a:rPr lang="en-US" dirty="0"/>
-              <a:t> function, whose function is to</a:t>
-            </a:r>
-            <a:r>
-              <a:rPr lang="en-US" i="1" dirty="0"/>
-              <a:t> change</a:t>
-            </a:r>
-            <a:r>
-              <a:rPr lang="en-US" dirty="0"/>
-              <a:t> directories </a:t>
+              <a:t>	$ x=3 </a:t>
+            </a:r>
+          </a:p>
+          <a:p>
+            <a:pPr marL="0" indent="0">
+              <a:buNone/>
+            </a:pPr>
+            <a:r>
+              <a:rPr lang="en-US" dirty="0"/>
+              <a:t>	$ echo $x </a:t>
+            </a:r>
+          </a:p>
+          <a:p>
+            <a:pPr marL="0" indent="0">
+              <a:buNone/>
+            </a:pPr>
+            <a:r>
+              <a:rPr lang="en-US" dirty="0"/>
+              <a:t>	3</a:t>
             </a:r>
           </a:p>
         </p:txBody>
@@ -11248,7 +11560,7 @@
     </p:spTree>
     <p:extLst>
       <p:ext uri="{BB962C8B-B14F-4D97-AF65-F5344CB8AC3E}">
-        <p14:creationId xmlns:p14="http://schemas.microsoft.com/office/powerpoint/2010/main" val="1383755132"/>
+        <p14:creationId xmlns:p14="http://schemas.microsoft.com/office/powerpoint/2010/main" val="1535536083"/>
       </p:ext>
     </p:extLst>
   </p:cSld>
@@ -11291,12 +11603,20 @@
           <a:lstStyle/>
           <a:p>
             <a:r>
-              <a:rPr lang="en-US" i="1" dirty="0"/>
-              <a:t>cd</a:t>
-            </a:r>
-            <a:r>
-              <a:rPr lang="en-US" dirty="0"/>
-              <a:t>: Change Directory </a:t>
+              <a:rPr lang="en-US" i="1" dirty="0" err="1"/>
+              <a:t>pwd</a:t>
+            </a:r>
+            <a:r>
+              <a:rPr lang="en-US" dirty="0"/>
+              <a:t>: Print Working Directory [</a:t>
+            </a:r>
+            <a:r>
+              <a:rPr lang="en-US" i="1" dirty="0" err="1"/>
+              <a:t>chdir</a:t>
+            </a:r>
+            <a:r>
+              <a:rPr lang="en-US" dirty="0"/>
+              <a:t>]  </a:t>
             </a:r>
             <a:endParaRPr lang="en-US" i="1" dirty="0"/>
           </a:p>
@@ -11314,73 +11634,31 @@
         </p:nvSpPr>
         <p:spPr>
           <a:xfrm>
-            <a:off x="680321" y="2336873"/>
-            <a:ext cx="9613861" cy="4241348"/>
+            <a:off x="680321" y="2336872"/>
+            <a:ext cx="9613861" cy="4306815"/>
           </a:xfrm>
         </p:spPr>
         <p:txBody>
           <a:bodyPr/>
           <a:lstStyle/>
           <a:p>
-            <a:pPr marL="0" marR="0" lvl="0" indent="0" defTabSz="914400" eaLnBrk="1" fontAlgn="auto" latinLnBrk="0" hangingPunct="1">
-              <a:lnSpc>
-                <a:spcPct val="100000"/>
-              </a:lnSpc>
-              <a:spcBef>
-                <a:spcPts val="0"/>
-              </a:spcBef>
-              <a:spcAft>
-                <a:spcPts val="0"/>
-              </a:spcAft>
-              <a:buClrTx/>
-              <a:buSzTx/>
-              <a:buFontTx/>
-              <a:buNone/>
-              <a:tabLst/>
-              <a:defRPr/>
-            </a:pPr>
-            <a:r>
-              <a:rPr lang="en-US" dirty="0"/>
-              <a:t>Change the directory you’re currently in </a:t>
-            </a:r>
-          </a:p>
-          <a:p>
-            <a:pPr marL="0" marR="0" lvl="0" indent="0" defTabSz="914400" eaLnBrk="1" fontAlgn="auto" latinLnBrk="0" hangingPunct="1">
-              <a:lnSpc>
-                <a:spcPct val="100000"/>
-              </a:lnSpc>
-              <a:spcBef>
-                <a:spcPts val="0"/>
-              </a:spcBef>
-              <a:spcAft>
-                <a:spcPts val="0"/>
-              </a:spcAft>
-              <a:buClrTx/>
-              <a:buSzTx/>
-              <a:buFontTx/>
-              <a:buNone/>
-              <a:tabLst/>
-              <a:defRPr/>
+            <a:pPr marL="0" indent="0">
+              <a:buNone/>
+            </a:pPr>
+            <a:r>
+              <a:rPr lang="en-US" dirty="0"/>
+              <a:t>Prints the name of the directory you’re currently in </a:t>
+            </a:r>
+          </a:p>
+          <a:p>
+            <a:pPr marL="0" indent="0">
+              <a:buNone/>
             </a:pPr>
             <a:endParaRPr lang="en-US" dirty="0"/>
           </a:p>
           <a:p>
-            <a:pPr marL="0" marR="0" lvl="0" indent="0" defTabSz="914400" eaLnBrk="1" fontAlgn="auto" latinLnBrk="0" hangingPunct="1">
-              <a:lnSpc>
-                <a:spcPct val="100000"/>
-              </a:lnSpc>
-              <a:spcBef>
-                <a:spcPts val="0"/>
-              </a:spcBef>
-              <a:spcAft>
-                <a:spcPts val="0"/>
-              </a:spcAft>
-              <a:buClrTx/>
-              <a:buSzTx/>
-              <a:buFontTx/>
-              <a:buNone/>
-              <a:tabLst/>
-              <a:defRPr/>
+            <a:pPr marL="0" indent="0">
+              <a:buNone/>
             </a:pPr>
             <a:r>
               <a:rPr lang="en-US" dirty="0"/>
@@ -11388,22 +11666,8 @@
             </a:r>
           </a:p>
           <a:p>
-            <a:pPr marL="0" marR="0" lvl="0" indent="0" defTabSz="914400" eaLnBrk="1" fontAlgn="auto" latinLnBrk="0" hangingPunct="1">
-              <a:lnSpc>
-                <a:spcPct val="100000"/>
-              </a:lnSpc>
-              <a:spcBef>
-                <a:spcPts val="0"/>
-              </a:spcBef>
-              <a:spcAft>
-                <a:spcPts val="0"/>
-              </a:spcAft>
-              <a:buClrTx/>
-              <a:buSzTx/>
-              <a:buFontTx/>
-              <a:buNone/>
-              <a:tabLst/>
-              <a:defRPr/>
+            <a:pPr marL="0" indent="0">
+              <a:buNone/>
             </a:pPr>
             <a:r>
               <a:rPr lang="en-US" dirty="0"/>
@@ -11419,22 +11683,8 @@
             </a:r>
           </a:p>
           <a:p>
-            <a:pPr marL="0" marR="0" lvl="0" indent="0" defTabSz="914400" eaLnBrk="1" fontAlgn="auto" latinLnBrk="0" hangingPunct="1">
-              <a:lnSpc>
-                <a:spcPct val="100000"/>
-              </a:lnSpc>
-              <a:spcBef>
-                <a:spcPts val="0"/>
-              </a:spcBef>
-              <a:spcAft>
-                <a:spcPts val="0"/>
-              </a:spcAft>
-              <a:buClrTx/>
-              <a:buSzTx/>
-              <a:buFontTx/>
-              <a:buNone/>
-              <a:tabLst/>
-              <a:defRPr/>
+            <a:pPr marL="0" indent="0">
+              <a:buNone/>
             </a:pPr>
             <a:r>
               <a:rPr lang="en-US" dirty="0"/>
@@ -11446,30 +11696,7 @@
             </a:r>
             <a:r>
               <a:rPr lang="en-US" dirty="0"/>
-              <a:t> </a:t>
-            </a:r>
-          </a:p>
-          <a:p>
-            <a:pPr marL="0" marR="0" lvl="0" indent="0" defTabSz="914400" eaLnBrk="1" fontAlgn="auto" latinLnBrk="0" hangingPunct="1">
-              <a:lnSpc>
-                <a:spcPct val="100000"/>
-              </a:lnSpc>
-              <a:spcBef>
-                <a:spcPts val="0"/>
-              </a:spcBef>
-              <a:spcAft>
-                <a:spcPts val="0"/>
-              </a:spcAft>
-              <a:buClrTx/>
-              <a:buSzTx/>
-              <a:buFontTx/>
-              <a:buNone/>
-              <a:tabLst/>
-              <a:defRPr/>
-            </a:pPr>
-            <a:r>
-              <a:rPr lang="en-US" dirty="0"/>
-              <a:t>	$ cd Desktop/SURP/</a:t>
+              <a:t>/Desktop/SURP/</a:t>
             </a:r>
             <a:r>
               <a:rPr lang="en-US" dirty="0" err="1"/>
@@ -11477,139 +11704,38 @@
             </a:r>
             <a:r>
               <a:rPr lang="en-US" dirty="0"/>
-              <a:t> </a:t>
-            </a:r>
-          </a:p>
-          <a:p>
-            <a:pPr marL="0" marR="0" lvl="0" indent="0" defTabSz="914400" eaLnBrk="1" fontAlgn="auto" latinLnBrk="0" hangingPunct="1">
-              <a:lnSpc>
-                <a:spcPct val="100000"/>
-              </a:lnSpc>
-              <a:spcBef>
-                <a:spcPts val="0"/>
-              </a:spcBef>
-              <a:spcAft>
-                <a:spcPts val="0"/>
-              </a:spcAft>
-              <a:buClrTx/>
-              <a:buSzTx/>
-              <a:buFontTx/>
-              <a:buNone/>
-              <a:tabLst/>
-              <a:defRPr/>
-            </a:pPr>
-            <a:r>
-              <a:rPr lang="en-US" dirty="0"/>
-              <a:t>	$ </a:t>
-            </a:r>
-            <a:r>
-              <a:rPr lang="en-US" dirty="0" err="1"/>
-              <a:t>pwd</a:t>
-            </a:r>
-            <a:r>
-              <a:rPr lang="en-US" dirty="0"/>
-              <a:t> </a:t>
-            </a:r>
-          </a:p>
-          <a:p>
-            <a:pPr marL="0" marR="0" lvl="0" indent="0" defTabSz="914400" eaLnBrk="1" fontAlgn="auto" latinLnBrk="0" hangingPunct="1">
-              <a:lnSpc>
-                <a:spcPct val="100000"/>
-              </a:lnSpc>
-              <a:spcBef>
-                <a:spcPts val="0"/>
-              </a:spcBef>
-              <a:spcAft>
-                <a:spcPts val="0"/>
-              </a:spcAft>
-              <a:buClrTx/>
-              <a:buSzTx/>
-              <a:buFontTx/>
-              <a:buNone/>
-              <a:tabLst/>
-              <a:defRPr/>
-            </a:pPr>
-            <a:r>
-              <a:rPr lang="en-US" dirty="0"/>
-              <a:t>	/Users/</a:t>
-            </a:r>
-            <a:r>
-              <a:rPr lang="en-US" dirty="0" err="1"/>
-              <a:t>BrutusBuckeye</a:t>
-            </a:r>
-            <a:r>
-              <a:rPr lang="en-US" dirty="0"/>
-              <a:t>/Desktop/SURP/</a:t>
-            </a:r>
-            <a:r>
-              <a:rPr lang="en-US" dirty="0" err="1"/>
-              <a:t>bootcamp</a:t>
-            </a:r>
-            <a:r>
-              <a:rPr lang="en-US" dirty="0"/>
-              <a:t> </a:t>
-            </a:r>
-          </a:p>
-          <a:p>
-            <a:pPr marL="0" marR="0" lvl="0" indent="0" defTabSz="914400" eaLnBrk="1" fontAlgn="auto" latinLnBrk="0" hangingPunct="1">
-              <a:lnSpc>
-                <a:spcPct val="100000"/>
-              </a:lnSpc>
-              <a:spcBef>
-                <a:spcPts val="0"/>
-              </a:spcBef>
-              <a:spcAft>
-                <a:spcPts val="0"/>
-              </a:spcAft>
-              <a:buClrTx/>
-              <a:buSzTx/>
-              <a:buFontTx/>
-              <a:buNone/>
-              <a:tabLst/>
-              <a:defRPr/>
-            </a:pPr>
-            <a:r>
-              <a:rPr lang="en-US" dirty="0"/>
-              <a:t>	$ cd .. (/Users/</a:t>
-            </a:r>
-            <a:r>
-              <a:rPr lang="en-US" dirty="0" err="1"/>
-              <a:t>BrutusBuckeye</a:t>
-            </a:r>
-            <a:r>
-              <a:rPr lang="en-US" dirty="0"/>
-              <a:t>/Desktop/SURP) </a:t>
-            </a:r>
-          </a:p>
-          <a:p>
-            <a:pPr marL="0" marR="0" lvl="0" indent="0" defTabSz="914400" eaLnBrk="1" fontAlgn="auto" latinLnBrk="0" hangingPunct="1">
-              <a:lnSpc>
-                <a:spcPct val="100000"/>
-              </a:lnSpc>
-              <a:spcBef>
-                <a:spcPts val="0"/>
-              </a:spcBef>
-              <a:spcAft>
-                <a:spcPts val="0"/>
-              </a:spcAft>
-              <a:buClrTx/>
-              <a:buSzTx/>
-              <a:buFontTx/>
-              <a:buNone/>
-              <a:tabLst/>
-              <a:defRPr/>
-            </a:pPr>
-            <a:r>
-              <a:rPr lang="en-US" dirty="0"/>
-              <a:t>	$ cd ~ (/Users/</a:t>
-            </a:r>
-            <a:r>
-              <a:rPr lang="en-US" dirty="0" err="1"/>
-              <a:t>BrutusBuckeye</a:t>
-            </a:r>
-            <a:r>
-              <a:rPr lang="en-US" dirty="0"/>
-              <a:t>) </a:t>
+              <a:t>/</a:t>
+            </a:r>
+          </a:p>
+          <a:p>
+            <a:pPr marL="0" indent="0">
+              <a:buNone/>
+            </a:pPr>
+            <a:endParaRPr lang="en-US" dirty="0"/>
+          </a:p>
+          <a:p>
+            <a:pPr marL="0" indent="0">
+              <a:buNone/>
+            </a:pPr>
+            <a:r>
+              <a:rPr lang="en-US" dirty="0"/>
+              <a:t> Note: Windows users should be careful not to confuse this with Python’s </a:t>
+            </a:r>
+            <a:r>
+              <a:rPr lang="en-US" i="1" dirty="0" err="1"/>
+              <a:t>os.chdir</a:t>
+            </a:r>
+            <a:r>
+              <a:rPr lang="en-US" dirty="0"/>
+              <a:t> function, whose function is to</a:t>
+            </a:r>
+            <a:r>
+              <a:rPr lang="en-US" i="1" dirty="0"/>
+              <a:t> change</a:t>
+            </a:r>
+            <a:r>
+              <a:rPr lang="en-US" dirty="0"/>
+              <a:t> directories </a:t>
             </a:r>
           </a:p>
         </p:txBody>
@@ -11617,7 +11743,7 @@
     </p:spTree>
     <p:extLst>
       <p:ext uri="{BB962C8B-B14F-4D97-AF65-F5344CB8AC3E}">
-        <p14:creationId xmlns:p14="http://schemas.microsoft.com/office/powerpoint/2010/main" val="1682080893"/>
+        <p14:creationId xmlns:p14="http://schemas.microsoft.com/office/powerpoint/2010/main" val="1383755132"/>
       </p:ext>
     </p:extLst>
   </p:cSld>
@@ -11661,19 +11787,11 @@
           <a:p>
             <a:r>
               <a:rPr lang="en-US" i="1" dirty="0"/>
-              <a:t>ls</a:t>
-            </a:r>
-            <a:r>
-              <a:rPr lang="en-US" dirty="0"/>
-              <a:t>: List [</a:t>
-            </a:r>
-            <a:r>
-              <a:rPr lang="en-US" i="1" dirty="0" err="1"/>
-              <a:t>dir</a:t>
-            </a:r>
-            <a:r>
-              <a:rPr lang="en-US" dirty="0"/>
-              <a:t>] </a:t>
+              <a:t>cd</a:t>
+            </a:r>
+            <a:r>
+              <a:rPr lang="en-US" dirty="0"/>
+              <a:t>: Change Directory </a:t>
             </a:r>
             <a:endParaRPr lang="en-US" i="1" dirty="0"/>
           </a:p>
@@ -11691,8 +11809,8 @@
         </p:nvSpPr>
         <p:spPr>
           <a:xfrm>
-            <a:off x="680321" y="2336872"/>
-            <a:ext cx="9613861" cy="4268643"/>
+            <a:off x="680321" y="2336873"/>
+            <a:ext cx="9613861" cy="4241348"/>
           </a:xfrm>
         </p:spPr>
         <p:txBody>
@@ -11718,7 +11836,7 @@
             </a:pPr>
             <a:r>
               <a:rPr lang="en-US" dirty="0"/>
-              <a:t>List all files in a given directory </a:t>
+              <a:t>Change the directory you’re currently in </a:t>
             </a:r>
           </a:p>
           <a:p>
@@ -11823,14 +11941,6 @@
             </a:r>
             <a:r>
               <a:rPr lang="en-US" dirty="0"/>
-              <a:t>/Desktop/SURP/</a:t>
-            </a:r>
-            <a:r>
-              <a:rPr lang="en-US" dirty="0" err="1"/>
-              <a:t>bootcamp</a:t>
-            </a:r>
-            <a:r>
-              <a:rPr lang="en-US" dirty="0"/>
               <a:t> </a:t>
             </a:r>
           </a:p>
@@ -11854,7 +11964,15 @@
             </a:pPr>
             <a:r>
               <a:rPr lang="en-US" dirty="0"/>
-              <a:t>	$ ls </a:t>
+              <a:t>	$ cd Desktop/SURP/</a:t>
+            </a:r>
+            <a:r>
+              <a:rPr lang="en-US" dirty="0" err="1"/>
+              <a:t>bootcamp</a:t>
+            </a:r>
+            <a:r>
+              <a:rPr lang="en-US" dirty="0"/>
+              <a:t> </a:t>
             </a:r>
           </a:p>
           <a:p>
@@ -11877,13 +11995,16 @@
             </a:pPr>
             <a:r>
               <a:rPr lang="en-US" dirty="0"/>
-              <a:t>	exercises notes slides </a:t>
+              <a:t>	$ </a:t>
             </a:r>
             <a:r>
               <a:rPr lang="en-US" dirty="0" err="1"/>
-              <a:t>somecode.py</a:t>
-            </a:r>
-            <a:endParaRPr lang="en-US" dirty="0"/>
+              <a:t>pwd</a:t>
+            </a:r>
+            <a:r>
+              <a:rPr lang="en-US" dirty="0"/>
+              <a:t> </a:t>
+            </a:r>
           </a:p>
           <a:p>
             <a:pPr marL="0" marR="0" lvl="0" indent="0" defTabSz="914400" eaLnBrk="1" fontAlgn="auto" latinLnBrk="0" hangingPunct="1">
@@ -11905,7 +12026,23 @@
             </a:pPr>
             <a:r>
               <a:rPr lang="en-US" dirty="0"/>
-              <a:t>	$ cd .. </a:t>
+              <a:t>	/Users/</a:t>
+            </a:r>
+            <a:r>
+              <a:rPr lang="en-US" dirty="0" err="1"/>
+              <a:t>BrutusBuckeye</a:t>
+            </a:r>
+            <a:r>
+              <a:rPr lang="en-US" dirty="0"/>
+              <a:t>/Desktop/SURP/</a:t>
+            </a:r>
+            <a:r>
+              <a:rPr lang="en-US" dirty="0" err="1"/>
+              <a:t>bootcamp</a:t>
+            </a:r>
+            <a:r>
+              <a:rPr lang="en-US" dirty="0"/>
+              <a:t> </a:t>
             </a:r>
           </a:p>
           <a:p>
@@ -11928,7 +12065,15 @@
             </a:pPr>
             <a:r>
               <a:rPr lang="en-US" dirty="0"/>
-              <a:t>	$ ls </a:t>
+              <a:t>	$ cd .. (/Users/</a:t>
+            </a:r>
+            <a:r>
+              <a:rPr lang="en-US" dirty="0" err="1"/>
+              <a:t>BrutusBuckeye</a:t>
+            </a:r>
+            <a:r>
+              <a:rPr lang="en-US" dirty="0"/>
+              <a:t>/Desktop/SURP) </a:t>
             </a:r>
           </a:p>
           <a:p>
@@ -11951,31 +12096,15 @@
             </a:pPr>
             <a:r>
               <a:rPr lang="en-US" dirty="0"/>
-              <a:t>	</a:t>
+              <a:t>	$ cd ~ (/Users/</a:t>
             </a:r>
             <a:r>
               <a:rPr lang="en-US" dirty="0" err="1"/>
-              <a:t>bootcamp</a:t>
-            </a:r>
-            <a:r>
-              <a:rPr lang="en-US" dirty="0"/>
-              <a:t> plots papers </a:t>
-            </a:r>
-            <a:r>
-              <a:rPr lang="en-US" dirty="0" err="1"/>
-              <a:t>notebook.ipynb</a:t>
-            </a:r>
-            <a:r>
-              <a:rPr lang="en-US" dirty="0"/>
-              <a:t> </a:t>
-            </a:r>
-            <a:r>
-              <a:rPr lang="en-US" dirty="0" err="1"/>
-              <a:t>textfilecode.py</a:t>
-            </a:r>
-            <a:r>
-              <a:rPr lang="en-US" dirty="0"/>
-              <a:t> </a:t>
+              <a:t>BrutusBuckeye</a:t>
+            </a:r>
+            <a:r>
+              <a:rPr lang="en-US" dirty="0"/>
+              <a:t>) </a:t>
             </a:r>
           </a:p>
         </p:txBody>
@@ -11983,7 +12112,7 @@
     </p:spTree>
     <p:extLst>
       <p:ext uri="{BB962C8B-B14F-4D97-AF65-F5344CB8AC3E}">
-        <p14:creationId xmlns:p14="http://schemas.microsoft.com/office/powerpoint/2010/main" val="875844630"/>
+        <p14:creationId xmlns:p14="http://schemas.microsoft.com/office/powerpoint/2010/main" val="1682080893"/>
       </p:ext>
     </p:extLst>
   </p:cSld>
@@ -12027,15 +12156,15 @@
           <a:p>
             <a:r>
               <a:rPr lang="en-US" i="1" dirty="0"/>
-              <a:t>mv</a:t>
-            </a:r>
-            <a:r>
-              <a:rPr lang="en-US" dirty="0"/>
-              <a:t>: Move [</a:t>
-            </a:r>
-            <a:r>
-              <a:rPr lang="en-US" i="1" dirty="0"/>
-              <a:t>move</a:t>
+              <a:t>ls</a:t>
+            </a:r>
+            <a:r>
+              <a:rPr lang="en-US" dirty="0"/>
+              <a:t>: List [</a:t>
+            </a:r>
+            <a:r>
+              <a:rPr lang="en-US" i="1" dirty="0" err="1"/>
+              <a:t>dir</a:t>
             </a:r>
             <a:r>
               <a:rPr lang="en-US" dirty="0"/>
@@ -12058,46 +12187,72 @@
         <p:spPr>
           <a:xfrm>
             <a:off x="680321" y="2336872"/>
-            <a:ext cx="9613861" cy="4282291"/>
-          </a:xfrm>
-        </p:spPr>
-        <p:txBody>
-          <a:bodyPr>
-            <a:normAutofit/>
-          </a:bodyPr>
+            <a:ext cx="9613861" cy="4268643"/>
+          </a:xfrm>
+        </p:spPr>
+        <p:txBody>
+          <a:bodyPr/>
           <a:lstStyle/>
           <a:p>
-            <a:pPr marL="0" indent="0">
-              <a:buNone/>
-            </a:pPr>
-            <a:r>
-              <a:rPr lang="en-US" dirty="0"/>
-              <a:t>Move (i.e. rename) a file or directory </a:t>
-            </a:r>
-          </a:p>
-          <a:p>
-            <a:pPr marL="0" indent="0">
-              <a:buNone/>
-            </a:pPr>
-            <a:r>
-              <a:rPr lang="en-US" dirty="0"/>
-              <a:t>Usage: </a:t>
-            </a:r>
-            <a:r>
-              <a:rPr lang="en-US" i="1" dirty="0"/>
-              <a:t>mv [old file name] [new file name] </a:t>
-            </a:r>
+            <a:pPr marL="0" marR="0" lvl="0" indent="0" defTabSz="914400" eaLnBrk="1" fontAlgn="auto" latinLnBrk="0" hangingPunct="1">
+              <a:lnSpc>
+                <a:spcPct val="100000"/>
+              </a:lnSpc>
+              <a:spcBef>
+                <a:spcPts val="0"/>
+              </a:spcBef>
+              <a:spcAft>
+                <a:spcPts val="0"/>
+              </a:spcAft>
+              <a:buClrTx/>
+              <a:buSzTx/>
+              <a:buFontTx/>
+              <a:buNone/>
+              <a:tabLst/>
+              <a:defRPr/>
+            </a:pPr>
+            <a:r>
+              <a:rPr lang="en-US" dirty="0"/>
+              <a:t>List all files in a given directory </a:t>
+            </a:r>
+          </a:p>
+          <a:p>
+            <a:pPr marL="0" marR="0" lvl="0" indent="0" defTabSz="914400" eaLnBrk="1" fontAlgn="auto" latinLnBrk="0" hangingPunct="1">
+              <a:lnSpc>
+                <a:spcPct val="100000"/>
+              </a:lnSpc>
+              <a:spcBef>
+                <a:spcPts val="0"/>
+              </a:spcBef>
+              <a:spcAft>
+                <a:spcPts val="0"/>
+              </a:spcAft>
+              <a:buClrTx/>
+              <a:buSzTx/>
+              <a:buFontTx/>
+              <a:buNone/>
+              <a:tabLst/>
+              <a:defRPr/>
+            </a:pPr>
             <a:endParaRPr lang="en-US" dirty="0"/>
           </a:p>
           <a:p>
-            <a:pPr marL="0" indent="0">
-              <a:buNone/>
-            </a:pPr>
-            <a:endParaRPr lang="en-US" dirty="0"/>
-          </a:p>
-          <a:p>
-            <a:pPr marL="0" indent="0">
-              <a:buNone/>
+            <a:pPr marL="0" marR="0" lvl="0" indent="0" defTabSz="914400" eaLnBrk="1" fontAlgn="auto" latinLnBrk="0" hangingPunct="1">
+              <a:lnSpc>
+                <a:spcPct val="100000"/>
+              </a:lnSpc>
+              <a:spcBef>
+                <a:spcPts val="0"/>
+              </a:spcBef>
+              <a:spcAft>
+                <a:spcPts val="0"/>
+              </a:spcAft>
+              <a:buClrTx/>
+              <a:buSzTx/>
+              <a:buFontTx/>
+              <a:buNone/>
+              <a:tabLst/>
+              <a:defRPr/>
             </a:pPr>
             <a:r>
               <a:rPr lang="en-US" dirty="0"/>
@@ -12105,8 +12260,22 @@
             </a:r>
           </a:p>
           <a:p>
-            <a:pPr marL="0" indent="0">
-              <a:buNone/>
+            <a:pPr marL="0" marR="0" lvl="0" indent="0" defTabSz="914400" eaLnBrk="1" fontAlgn="auto" latinLnBrk="0" hangingPunct="1">
+              <a:lnSpc>
+                <a:spcPct val="100000"/>
+              </a:lnSpc>
+              <a:spcBef>
+                <a:spcPts val="0"/>
+              </a:spcBef>
+              <a:spcAft>
+                <a:spcPts val="0"/>
+              </a:spcAft>
+              <a:buClrTx/>
+              <a:buSzTx/>
+              <a:buFontTx/>
+              <a:buNone/>
+              <a:tabLst/>
+              <a:defRPr/>
             </a:pPr>
             <a:r>
               <a:rPr lang="en-US" dirty="0"/>
@@ -12122,8 +12291,22 @@
             </a:r>
           </a:p>
           <a:p>
-            <a:pPr marL="0" indent="0">
-              <a:buNone/>
+            <a:pPr marL="0" marR="0" lvl="0" indent="0" defTabSz="914400" eaLnBrk="1" fontAlgn="auto" latinLnBrk="0" hangingPunct="1">
+              <a:lnSpc>
+                <a:spcPct val="100000"/>
+              </a:lnSpc>
+              <a:spcBef>
+                <a:spcPts val="0"/>
+              </a:spcBef>
+              <a:spcAft>
+                <a:spcPts val="0"/>
+              </a:spcAft>
+              <a:buClrTx/>
+              <a:buSzTx/>
+              <a:buFontTx/>
+              <a:buNone/>
+              <a:tabLst/>
+              <a:defRPr/>
             </a:pPr>
             <a:r>
               <a:rPr lang="en-US" dirty="0"/>
@@ -12147,16 +12330,135 @@
             </a:r>
           </a:p>
           <a:p>
-            <a:pPr marL="0" indent="0">
-              <a:buNone/>
-            </a:pPr>
-            <a:r>
-              <a:rPr lang="en-US" dirty="0"/>
-              <a:t>	$ mv </a:t>
+            <a:pPr marL="0" marR="0" lvl="0" indent="0" defTabSz="914400" eaLnBrk="1" fontAlgn="auto" latinLnBrk="0" hangingPunct="1">
+              <a:lnSpc>
+                <a:spcPct val="100000"/>
+              </a:lnSpc>
+              <a:spcBef>
+                <a:spcPts val="0"/>
+              </a:spcBef>
+              <a:spcAft>
+                <a:spcPts val="0"/>
+              </a:spcAft>
+              <a:buClrTx/>
+              <a:buSzTx/>
+              <a:buFontTx/>
+              <a:buNone/>
+              <a:tabLst/>
+              <a:defRPr/>
+            </a:pPr>
+            <a:r>
+              <a:rPr lang="en-US" dirty="0"/>
+              <a:t>	$ ls </a:t>
+            </a:r>
+          </a:p>
+          <a:p>
+            <a:pPr marL="0" marR="0" lvl="0" indent="0" defTabSz="914400" eaLnBrk="1" fontAlgn="auto" latinLnBrk="0" hangingPunct="1">
+              <a:lnSpc>
+                <a:spcPct val="100000"/>
+              </a:lnSpc>
+              <a:spcBef>
+                <a:spcPts val="0"/>
+              </a:spcBef>
+              <a:spcAft>
+                <a:spcPts val="0"/>
+              </a:spcAft>
+              <a:buClrTx/>
+              <a:buSzTx/>
+              <a:buFontTx/>
+              <a:buNone/>
+              <a:tabLst/>
+              <a:defRPr/>
+            </a:pPr>
+            <a:r>
+              <a:rPr lang="en-US" dirty="0"/>
+              <a:t>	exercises notes slides </a:t>
             </a:r>
             <a:r>
               <a:rPr lang="en-US" dirty="0" err="1"/>
-              <a:t>oldname.py</a:t>
+              <a:t>somecode.py</a:t>
+            </a:r>
+            <a:endParaRPr lang="en-US" dirty="0"/>
+          </a:p>
+          <a:p>
+            <a:pPr marL="0" marR="0" lvl="0" indent="0" defTabSz="914400" eaLnBrk="1" fontAlgn="auto" latinLnBrk="0" hangingPunct="1">
+              <a:lnSpc>
+                <a:spcPct val="100000"/>
+              </a:lnSpc>
+              <a:spcBef>
+                <a:spcPts val="0"/>
+              </a:spcBef>
+              <a:spcAft>
+                <a:spcPts val="0"/>
+              </a:spcAft>
+              <a:buClrTx/>
+              <a:buSzTx/>
+              <a:buFontTx/>
+              <a:buNone/>
+              <a:tabLst/>
+              <a:defRPr/>
+            </a:pPr>
+            <a:r>
+              <a:rPr lang="en-US" dirty="0"/>
+              <a:t>	$ cd .. </a:t>
+            </a:r>
+          </a:p>
+          <a:p>
+            <a:pPr marL="0" marR="0" lvl="0" indent="0" defTabSz="914400" eaLnBrk="1" fontAlgn="auto" latinLnBrk="0" hangingPunct="1">
+              <a:lnSpc>
+                <a:spcPct val="100000"/>
+              </a:lnSpc>
+              <a:spcBef>
+                <a:spcPts val="0"/>
+              </a:spcBef>
+              <a:spcAft>
+                <a:spcPts val="0"/>
+              </a:spcAft>
+              <a:buClrTx/>
+              <a:buSzTx/>
+              <a:buFontTx/>
+              <a:buNone/>
+              <a:tabLst/>
+              <a:defRPr/>
+            </a:pPr>
+            <a:r>
+              <a:rPr lang="en-US" dirty="0"/>
+              <a:t>	$ ls </a:t>
+            </a:r>
+          </a:p>
+          <a:p>
+            <a:pPr marL="0" marR="0" lvl="0" indent="0" defTabSz="914400" eaLnBrk="1" fontAlgn="auto" latinLnBrk="0" hangingPunct="1">
+              <a:lnSpc>
+                <a:spcPct val="100000"/>
+              </a:lnSpc>
+              <a:spcBef>
+                <a:spcPts val="0"/>
+              </a:spcBef>
+              <a:spcAft>
+                <a:spcPts val="0"/>
+              </a:spcAft>
+              <a:buClrTx/>
+              <a:buSzTx/>
+              <a:buFontTx/>
+              <a:buNone/>
+              <a:tabLst/>
+              <a:defRPr/>
+            </a:pPr>
+            <a:r>
+              <a:rPr lang="en-US" dirty="0"/>
+              <a:t>	</a:t>
+            </a:r>
+            <a:r>
+              <a:rPr lang="en-US" dirty="0" err="1"/>
+              <a:t>bootcamp</a:t>
+            </a:r>
+            <a:r>
+              <a:rPr lang="en-US" dirty="0"/>
+              <a:t> plots papers </a:t>
+            </a:r>
+            <a:r>
+              <a:rPr lang="en-US" dirty="0" err="1"/>
+              <a:t>notebook.ipynb</a:t>
             </a:r>
             <a:r>
               <a:rPr lang="en-US" dirty="0"/>
@@ -12164,51 +12466,19 @@
             </a:r>
             <a:r>
               <a:rPr lang="en-US" dirty="0" err="1"/>
-              <a:t>newname.py</a:t>
+              <a:t>textfilecode.py</a:t>
             </a:r>
             <a:r>
               <a:rPr lang="en-US" dirty="0"/>
               <a:t> </a:t>
             </a:r>
-          </a:p>
-          <a:p>
-            <a:pPr marL="0" indent="0">
-              <a:buNone/>
-            </a:pPr>
-            <a:r>
-              <a:rPr lang="en-US" dirty="0"/>
-              <a:t>	$ ls </a:t>
-            </a:r>
-          </a:p>
-          <a:p>
-            <a:pPr marL="0" indent="0">
-              <a:buNone/>
-            </a:pPr>
-            <a:r>
-              <a:rPr lang="en-US" dirty="0"/>
-              <a:t>	exercises </a:t>
-            </a:r>
-            <a:r>
-              <a:rPr lang="en-US" dirty="0" err="1"/>
-              <a:t>newname.py</a:t>
-            </a:r>
-            <a:r>
-              <a:rPr lang="en-US" dirty="0"/>
-              <a:t> notes slides </a:t>
-            </a:r>
-          </a:p>
-          <a:p>
-            <a:pPr marL="0" indent="0">
-              <a:buNone/>
-            </a:pPr>
-            <a:endParaRPr lang="en-US" dirty="0"/>
           </a:p>
         </p:txBody>
       </p:sp>
     </p:spTree>
     <p:extLst>
       <p:ext uri="{BB962C8B-B14F-4D97-AF65-F5344CB8AC3E}">
-        <p14:creationId xmlns:p14="http://schemas.microsoft.com/office/powerpoint/2010/main" val="1741499932"/>
+        <p14:creationId xmlns:p14="http://schemas.microsoft.com/office/powerpoint/2010/main" val="875844630"/>
       </p:ext>
     </p:extLst>
   </p:cSld>
@@ -12251,16 +12521,16 @@
           <a:lstStyle/>
           <a:p>
             <a:r>
-              <a:rPr lang="en-US" i="1" dirty="0" err="1"/>
-              <a:t>cp</a:t>
-            </a:r>
-            <a:r>
-              <a:rPr lang="en-US" dirty="0"/>
-              <a:t>: Copy [</a:t>
-            </a:r>
-            <a:r>
               <a:rPr lang="en-US" i="1" dirty="0"/>
-              <a:t>copy</a:t>
+              <a:t>mv</a:t>
+            </a:r>
+            <a:r>
+              <a:rPr lang="en-US" dirty="0"/>
+              <a:t>: Move [</a:t>
+            </a:r>
+            <a:r>
+              <a:rPr lang="en-US" i="1" dirty="0"/>
+              <a:t>move</a:t>
             </a:r>
             <a:r>
               <a:rPr lang="en-US" dirty="0"/>
@@ -12283,7 +12553,7 @@
         <p:spPr>
           <a:xfrm>
             <a:off x="680321" y="2336872"/>
-            <a:ext cx="9613861" cy="4405121"/>
+            <a:ext cx="9613861" cy="4282291"/>
           </a:xfrm>
         </p:spPr>
         <p:txBody>
@@ -12297,7 +12567,7 @@
             </a:pPr>
             <a:r>
               <a:rPr lang="en-US" dirty="0"/>
-              <a:t>Copy a file to a new name/location </a:t>
+              <a:t>Move (i.e. rename) a file or directory </a:t>
             </a:r>
           </a:p>
           <a:p>
@@ -12309,12 +12579,8 @@
               <a:t>Usage: </a:t>
             </a:r>
             <a:r>
-              <a:rPr lang="en-US" i="1" dirty="0" err="1"/>
-              <a:t>cp</a:t>
-            </a:r>
-            <a:r>
               <a:rPr lang="en-US" i="1" dirty="0"/>
-              <a:t> [existing file name] [new file name] </a:t>
+              <a:t>mv [old file name] [new file name] </a:t>
             </a:r>
             <a:endParaRPr lang="en-US" dirty="0"/>
           </a:p>
@@ -12339,6 +12605,73 @@
             </a:pPr>
             <a:r>
               <a:rPr lang="en-US" dirty="0"/>
+              <a:t>	$ </a:t>
+            </a:r>
+            <a:r>
+              <a:rPr lang="en-US" dirty="0" err="1"/>
+              <a:t>pwd</a:t>
+            </a:r>
+            <a:r>
+              <a:rPr lang="en-US" dirty="0"/>
+              <a:t> </a:t>
+            </a:r>
+          </a:p>
+          <a:p>
+            <a:pPr marL="0" indent="0">
+              <a:buNone/>
+            </a:pPr>
+            <a:r>
+              <a:rPr lang="en-US" dirty="0"/>
+              <a:t>	/Users/</a:t>
+            </a:r>
+            <a:r>
+              <a:rPr lang="en-US" dirty="0" err="1"/>
+              <a:t>BrutusBuckeye</a:t>
+            </a:r>
+            <a:r>
+              <a:rPr lang="en-US" dirty="0"/>
+              <a:t>/Desktop/SURP/</a:t>
+            </a:r>
+            <a:r>
+              <a:rPr lang="en-US" dirty="0" err="1"/>
+              <a:t>bootcamp</a:t>
+            </a:r>
+            <a:r>
+              <a:rPr lang="en-US" dirty="0"/>
+              <a:t> </a:t>
+            </a:r>
+          </a:p>
+          <a:p>
+            <a:pPr marL="0" indent="0">
+              <a:buNone/>
+            </a:pPr>
+            <a:r>
+              <a:rPr lang="en-US" dirty="0"/>
+              <a:t>	$ mv </a:t>
+            </a:r>
+            <a:r>
+              <a:rPr lang="en-US" dirty="0" err="1"/>
+              <a:t>oldname.py</a:t>
+            </a:r>
+            <a:r>
+              <a:rPr lang="en-US" dirty="0"/>
+              <a:t> </a:t>
+            </a:r>
+            <a:r>
+              <a:rPr lang="en-US" dirty="0" err="1"/>
+              <a:t>newname.py</a:t>
+            </a:r>
+            <a:r>
+              <a:rPr lang="en-US" dirty="0"/>
+              <a:t> </a:t>
+            </a:r>
+          </a:p>
+          <a:p>
+            <a:pPr marL="0" indent="0">
+              <a:buNone/>
+            </a:pPr>
+            <a:r>
+              <a:rPr lang="en-US" dirty="0"/>
               <a:t>	$ ls </a:t>
             </a:r>
           </a:p>
@@ -12348,106 +12681,29 @@
             </a:pPr>
             <a:r>
               <a:rPr lang="en-US" dirty="0"/>
-              <a:t>	</a:t>
+              <a:t>	exercises </a:t>
             </a:r>
             <a:r>
               <a:rPr lang="en-US" dirty="0" err="1"/>
-              <a:t>data.dat</a:t>
-            </a:r>
-            <a:r>
-              <a:rPr lang="en-US" dirty="0"/>
-              <a:t> </a:t>
-            </a:r>
-            <a:r>
-              <a:rPr lang="en-US" dirty="0" err="1"/>
-              <a:t>result.out</a:t>
-            </a:r>
-            <a:r>
-              <a:rPr lang="en-US" dirty="0"/>
-              <a:t> somecode1.py </a:t>
+              <a:t>newname.py</a:t>
+            </a:r>
+            <a:r>
+              <a:rPr lang="en-US" dirty="0"/>
+              <a:t> notes slides </a:t>
             </a:r>
           </a:p>
           <a:p>
             <a:pPr marL="0" indent="0">
               <a:buNone/>
             </a:pPr>
-            <a:r>
-              <a:rPr lang="en-US" dirty="0"/>
-              <a:t>	$ </a:t>
-            </a:r>
-            <a:r>
-              <a:rPr lang="en-US" dirty="0" err="1"/>
-              <a:t>cp</a:t>
-            </a:r>
-            <a:r>
-              <a:rPr lang="en-US" dirty="0"/>
-              <a:t> </a:t>
-            </a:r>
-            <a:r>
-              <a:rPr lang="en-US" dirty="0" err="1"/>
-              <a:t>result.out</a:t>
-            </a:r>
-            <a:r>
-              <a:rPr lang="en-US" dirty="0"/>
-              <a:t> </a:t>
-            </a:r>
-            <a:r>
-              <a:rPr lang="en-US" dirty="0" err="1"/>
-              <a:t>copy.out</a:t>
-            </a:r>
-            <a:r>
-              <a:rPr lang="en-US" dirty="0"/>
-              <a:t> </a:t>
-            </a:r>
-          </a:p>
-          <a:p>
-            <a:pPr marL="0" indent="0">
-              <a:buNone/>
-            </a:pPr>
-            <a:r>
-              <a:rPr lang="en-US" dirty="0"/>
-              <a:t>	$ ls </a:t>
-            </a:r>
-          </a:p>
-          <a:p>
-            <a:pPr marL="0" indent="0">
-              <a:buNone/>
-            </a:pPr>
-            <a:r>
-              <a:rPr lang="en-US" dirty="0"/>
-              <a:t>	 </a:t>
-            </a:r>
-            <a:r>
-              <a:rPr lang="en-US" dirty="0" err="1"/>
-              <a:t>copy.out</a:t>
-            </a:r>
-            <a:r>
-              <a:rPr lang="en-US" dirty="0"/>
-              <a:t> </a:t>
-            </a:r>
-            <a:r>
-              <a:rPr lang="en-US" dirty="0" err="1"/>
-              <a:t>data.dat</a:t>
-            </a:r>
-            <a:r>
-              <a:rPr lang="en-US" dirty="0"/>
-              <a:t> </a:t>
-            </a:r>
-            <a:r>
-              <a:rPr lang="en-US" dirty="0" err="1"/>
-              <a:t>result.out</a:t>
-            </a:r>
-            <a:r>
-              <a:rPr lang="en-US" dirty="0"/>
-              <a:t> somecode1.py </a:t>
-            </a:r>
+            <a:endParaRPr lang="en-US" dirty="0"/>
           </a:p>
         </p:txBody>
       </p:sp>
     </p:spTree>
     <p:extLst>
       <p:ext uri="{BB962C8B-B14F-4D97-AF65-F5344CB8AC3E}">
-        <p14:creationId xmlns:p14="http://schemas.microsoft.com/office/powerpoint/2010/main" val="133284566"/>
+        <p14:creationId xmlns:p14="http://schemas.microsoft.com/office/powerpoint/2010/main" val="1741499932"/>
       </p:ext>
     </p:extLst>
   </p:cSld>

</xml_diff>

<commit_message>
slides: minor typo fix
</commit_message>
<xml_diff>
--- a/slides/terminal.pptx
+++ b/slides/terminal.pptx
@@ -11441,8 +11441,12 @@
           <a:lstStyle/>
           <a:p>
             <a:r>
-              <a:rPr lang="en-US" dirty="0"/>
-              <a:t>echo: Print Statements</a:t>
+              <a:rPr lang="en-US" i="1" dirty="0"/>
+              <a:t>echo</a:t>
+            </a:r>
+            <a:r>
+              <a:rPr lang="en-US" dirty="0"/>
+              <a:t>: Print Statements</a:t>
             </a:r>
           </a:p>
         </p:txBody>

</xml_diff>

<commit_message>
bootcamp page on my website noted on slides
</commit_message>
<xml_diff>
--- a/slides/terminal.pptx
+++ b/slides/terminal.pptx
@@ -216,7 +216,7 @@
           <a:p>
             <a:fld id="{6C47881A-27B6-E34F-9EF6-BF109EBF38B9}" type="datetimeFigureOut">
               <a:rPr lang="en-US" smtClean="0"/>
-              <a:t>5/9/22</a:t>
+              <a:t>5/7/23</a:t>
             </a:fld>
             <a:endParaRPr lang="en-US"/>
           </a:p>
@@ -1120,7 +1120,7 @@
           <a:p>
             <a:fld id="{51673806-0BCD-1F42-BAA8-2011034B3C6A}" type="datetimeFigureOut">
               <a:rPr lang="en-US" smtClean="0"/>
-              <a:t>5/9/22</a:t>
+              <a:t>5/7/23</a:t>
             </a:fld>
             <a:endParaRPr lang="en-US"/>
           </a:p>
@@ -1534,7 +1534,7 @@
           <a:p>
             <a:fld id="{51673806-0BCD-1F42-BAA8-2011034B3C6A}" type="datetimeFigureOut">
               <a:rPr lang="en-US" smtClean="0"/>
-              <a:t>5/9/22</a:t>
+              <a:t>5/7/23</a:t>
             </a:fld>
             <a:endParaRPr lang="en-US"/>
           </a:p>
@@ -1865,7 +1865,7 @@
           <a:p>
             <a:fld id="{51673806-0BCD-1F42-BAA8-2011034B3C6A}" type="datetimeFigureOut">
               <a:rPr lang="en-US" smtClean="0"/>
-              <a:t>5/9/22</a:t>
+              <a:t>5/7/23</a:t>
             </a:fld>
             <a:endParaRPr lang="en-US"/>
           </a:p>
@@ -2265,7 +2265,7 @@
           <a:p>
             <a:fld id="{51673806-0BCD-1F42-BAA8-2011034B3C6A}" type="datetimeFigureOut">
               <a:rPr lang="en-US" smtClean="0"/>
-              <a:t>5/9/22</a:t>
+              <a:t>5/7/23</a:t>
             </a:fld>
             <a:endParaRPr lang="en-US"/>
           </a:p>
@@ -2828,7 +2828,7 @@
           <a:p>
             <a:fld id="{51673806-0BCD-1F42-BAA8-2011034B3C6A}" type="datetimeFigureOut">
               <a:rPr lang="en-US" smtClean="0"/>
-              <a:t>5/9/22</a:t>
+              <a:t>5/7/23</a:t>
             </a:fld>
             <a:endParaRPr lang="en-US"/>
           </a:p>
@@ -3504,7 +3504,7 @@
           <a:p>
             <a:fld id="{51673806-0BCD-1F42-BAA8-2011034B3C6A}" type="datetimeFigureOut">
               <a:rPr lang="en-US" smtClean="0"/>
-              <a:t>5/9/22</a:t>
+              <a:t>5/7/23</a:t>
             </a:fld>
             <a:endParaRPr lang="en-US"/>
           </a:p>
@@ -4412,7 +4412,7 @@
           <a:p>
             <a:fld id="{51673806-0BCD-1F42-BAA8-2011034B3C6A}" type="datetimeFigureOut">
               <a:rPr lang="en-US" smtClean="0"/>
-              <a:t>5/9/22</a:t>
+              <a:t>5/7/23</a:t>
             </a:fld>
             <a:endParaRPr lang="en-US"/>
           </a:p>
@@ -4720,7 +4720,7 @@
           <a:p>
             <a:fld id="{51673806-0BCD-1F42-BAA8-2011034B3C6A}" type="datetimeFigureOut">
               <a:rPr lang="en-US" smtClean="0"/>
-              <a:t>5/9/22</a:t>
+              <a:t>5/7/23</a:t>
             </a:fld>
             <a:endParaRPr lang="en-US"/>
           </a:p>
@@ -4979,7 +4979,7 @@
           <a:p>
             <a:fld id="{51673806-0BCD-1F42-BAA8-2011034B3C6A}" type="datetimeFigureOut">
               <a:rPr lang="en-US" smtClean="0"/>
-              <a:t>5/9/22</a:t>
+              <a:t>5/7/23</a:t>
             </a:fld>
             <a:endParaRPr lang="en-US"/>
           </a:p>
@@ -5302,7 +5302,7 @@
           <a:p>
             <a:fld id="{51673806-0BCD-1F42-BAA8-2011034B3C6A}" type="datetimeFigureOut">
               <a:rPr lang="en-US" smtClean="0"/>
-              <a:t>5/9/22</a:t>
+              <a:t>5/7/23</a:t>
             </a:fld>
             <a:endParaRPr lang="en-US"/>
           </a:p>
@@ -5686,7 +5686,7 @@
           <a:p>
             <a:fld id="{51673806-0BCD-1F42-BAA8-2011034B3C6A}" type="datetimeFigureOut">
               <a:rPr lang="en-US" smtClean="0"/>
-              <a:t>5/9/22</a:t>
+              <a:t>5/7/23</a:t>
             </a:fld>
             <a:endParaRPr lang="en-US"/>
           </a:p>
@@ -6062,7 +6062,7 @@
           <a:p>
             <a:fld id="{51673806-0BCD-1F42-BAA8-2011034B3C6A}" type="datetimeFigureOut">
               <a:rPr lang="en-US" smtClean="0"/>
-              <a:t>5/9/22</a:t>
+              <a:t>5/7/23</a:t>
             </a:fld>
             <a:endParaRPr lang="en-US"/>
           </a:p>
@@ -6568,7 +6568,7 @@
           <a:p>
             <a:fld id="{51673806-0BCD-1F42-BAA8-2011034B3C6A}" type="datetimeFigureOut">
               <a:rPr lang="en-US" smtClean="0"/>
-              <a:t>5/9/22</a:t>
+              <a:t>5/7/23</a:t>
             </a:fld>
             <a:endParaRPr lang="en-US"/>
           </a:p>
@@ -6825,7 +6825,7 @@
           <a:p>
             <a:fld id="{51673806-0BCD-1F42-BAA8-2011034B3C6A}" type="datetimeFigureOut">
               <a:rPr lang="en-US" smtClean="0"/>
-              <a:t>5/9/22</a:t>
+              <a:t>5/7/23</a:t>
             </a:fld>
             <a:endParaRPr lang="en-US"/>
           </a:p>
@@ -6983,7 +6983,7 @@
           <a:p>
             <a:fld id="{51673806-0BCD-1F42-BAA8-2011034B3C6A}" type="datetimeFigureOut">
               <a:rPr lang="en-US" smtClean="0"/>
-              <a:t>5/9/22</a:t>
+              <a:t>5/7/23</a:t>
             </a:fld>
             <a:endParaRPr lang="en-US"/>
           </a:p>
@@ -7373,7 +7373,7 @@
           <a:p>
             <a:fld id="{51673806-0BCD-1F42-BAA8-2011034B3C6A}" type="datetimeFigureOut">
               <a:rPr lang="en-US" smtClean="0"/>
-              <a:t>5/9/22</a:t>
+              <a:t>5/7/23</a:t>
             </a:fld>
             <a:endParaRPr lang="en-US"/>
           </a:p>
@@ -7782,7 +7782,7 @@
           <a:p>
             <a:fld id="{51673806-0BCD-1F42-BAA8-2011034B3C6A}" type="datetimeFigureOut">
               <a:rPr lang="en-US" smtClean="0"/>
-              <a:t>5/9/22</a:t>
+              <a:t>5/7/23</a:t>
             </a:fld>
             <a:endParaRPr lang="en-US"/>
           </a:p>
@@ -8028,7 +8028,7 @@
             <a:fld id="{51673806-0BCD-1F42-BAA8-2011034B3C6A}" type="datetimeFigureOut">
               <a:rPr lang="en-US" smtClean="0"/>
               <a:pPr/>
-              <a:t>5/9/22</a:t>
+              <a:t>5/7/23</a:t>
             </a:fld>
             <a:endParaRPr lang="en-US" dirty="0"/>
           </a:p>
@@ -11218,13 +11218,38 @@
         </p:nvSpPr>
         <p:spPr>
           <a:xfrm>
-            <a:off x="322513" y="2418917"/>
-            <a:ext cx="6846913" cy="3599316"/>
+            <a:off x="322513" y="2133600"/>
+            <a:ext cx="6846913" cy="4515556"/>
           </a:xfrm>
         </p:spPr>
         <p:txBody>
           <a:bodyPr/>
           <a:lstStyle/>
+          <a:p>
+            <a:pPr marL="0" indent="0">
+              <a:buNone/>
+            </a:pPr>
+            <a:r>
+              <a:rPr lang="en-US" dirty="0"/>
+              <a:t>Online: </a:t>
+            </a:r>
+            <a:r>
+              <a:rPr lang="en-US" dirty="0">
+                <a:hlinkClick r:id="rId2"/>
+              </a:rPr>
+              <a:t>https://jamesjohnson.space/bootcamp</a:t>
+            </a:r>
+            <a:r>
+              <a:rPr lang="en-US" dirty="0"/>
+              <a:t> </a:t>
+            </a:r>
+          </a:p>
+          <a:p>
+            <a:pPr marL="0" indent="0">
+              <a:buNone/>
+            </a:pPr>
+            <a:endParaRPr lang="en-US" dirty="0"/>
+          </a:p>
           <a:p>
             <a:pPr marL="457200" indent="-457200">
               <a:buFont typeface="+mj-lt"/>
@@ -11250,7 +11275,7 @@
             </a:r>
             <a:r>
               <a:rPr lang="en-US" i="1" dirty="0">
-                <a:hlinkClick r:id="rId2"/>
+                <a:hlinkClick r:id="rId3"/>
               </a:rPr>
               <a:t>https://github.com/giganano/PythonBootcamp.git</a:t>
             </a:r>
@@ -11311,7 +11336,7 @@
           <p:nvPr/>
         </p:nvPicPr>
         <p:blipFill>
-          <a:blip r:embed="rId3"/>
+          <a:blip r:embed="rId4"/>
           <a:stretch>
             <a:fillRect/>
           </a:stretch>

</xml_diff>